<commit_message>
Adding new payload with sqlite implementation.. Adding the Moq lib. Adding new markdown document for Moq documentation.
</commit_message>
<xml_diff>
--- a/Presentation/Unit Testing with Xunit - Moq.pptx
+++ b/Presentation/Unit Testing with Xunit - Moq.pptx
@@ -5,10 +5,10 @@
     <p:sldMasterId id="2147483648" r:id="rId4"/>
   </p:sldMasterIdLst>
   <p:notesMasterIdLst>
-    <p:notesMasterId r:id="rId12"/>
+    <p:notesMasterId r:id="rId13"/>
   </p:notesMasterIdLst>
   <p:handoutMasterIdLst>
-    <p:handoutMasterId r:id="rId13"/>
+    <p:handoutMasterId r:id="rId14"/>
   </p:handoutMasterIdLst>
   <p:sldIdLst>
     <p:sldId id="256" r:id="rId5"/>
@@ -17,7 +17,8 @@
     <p:sldId id="273" r:id="rId8"/>
     <p:sldId id="274" r:id="rId9"/>
     <p:sldId id="275" r:id="rId10"/>
-    <p:sldId id="276" r:id="rId11"/>
+    <p:sldId id="277" r:id="rId11"/>
+    <p:sldId id="276" r:id="rId12"/>
   </p:sldIdLst>
   <p:sldSz cx="12192000" cy="6858000"/>
   <p:notesSz cx="6858000" cy="9144000"/>
@@ -9694,13 +9695,8 @@
           <a:p>
             <a:r>
               <a:rPr lang="en-US" dirty="0"/>
-              <a:t>Unit Testing with Xunit.net &amp; </a:t>
-            </a:r>
-            <a:r>
-              <a:rPr lang="en-US" dirty="0" err="1"/>
-              <a:t>Moq</a:t>
-            </a:r>
-            <a:endParaRPr lang="en-US" dirty="0"/>
+              <a:t>Unit Testing with Xunit.net &amp; Moq</a:t>
+            </a:r>
           </a:p>
         </p:txBody>
       </p:sp>
@@ -9864,15 +9860,7 @@
           <a:p>
             <a:r>
               <a:rPr lang="en-US" dirty="0"/>
-              <a:t>What's </a:t>
-            </a:r>
-            <a:r>
-              <a:rPr lang="en-US" dirty="0" err="1"/>
-              <a:t>Moq</a:t>
-            </a:r>
-            <a:r>
-              <a:rPr lang="en-US" dirty="0"/>
-              <a:t>?</a:t>
+              <a:t>What's Moq?</a:t>
             </a:r>
           </a:p>
           <a:p>
@@ -9944,13 +9932,8 @@
           <a:p>
             <a:r>
               <a:rPr lang="en-US" dirty="0"/>
-              <a:t>Unit testing  with Xunit.net &amp; </a:t>
-            </a:r>
-            <a:r>
-              <a:rPr lang="en-US" dirty="0" err="1"/>
-              <a:t>Moq</a:t>
-            </a:r>
-            <a:endParaRPr lang="en-US" dirty="0"/>
+              <a:t>Unit testing  with Xunit.net &amp; Moq</a:t>
+            </a:r>
           </a:p>
         </p:txBody>
       </p:sp>
@@ -10222,13 +10205,8 @@
           <a:p>
             <a:r>
               <a:rPr lang="en-US" dirty="0"/>
-              <a:t>Unit testing  with Xunit.net &amp; </a:t>
-            </a:r>
-            <a:r>
-              <a:rPr lang="en-US" dirty="0" err="1"/>
-              <a:t>Moq</a:t>
-            </a:r>
-            <a:endParaRPr lang="en-US" dirty="0"/>
+              <a:t>Unit testing  with Xunit.net &amp; Moq</a:t>
+            </a:r>
           </a:p>
         </p:txBody>
       </p:sp>
@@ -10506,13 +10484,8 @@
           <a:p>
             <a:r>
               <a:rPr lang="en-US" dirty="0"/>
-              <a:t>Unit testing  with Xunit.net &amp; </a:t>
-            </a:r>
-            <a:r>
-              <a:rPr lang="en-US" dirty="0" err="1"/>
-              <a:t>Moq</a:t>
-            </a:r>
-            <a:endParaRPr lang="en-US" dirty="0"/>
+              <a:t>Unit testing  with Xunit.net &amp; Moq</a:t>
+            </a:r>
           </a:p>
         </p:txBody>
       </p:sp>
@@ -10760,13 +10733,8 @@
           <a:p>
             <a:r>
               <a:rPr lang="en-US" dirty="0"/>
-              <a:t>Unit testing  with Xunit.net &amp; </a:t>
-            </a:r>
-            <a:r>
-              <a:rPr lang="en-US" dirty="0" err="1"/>
-              <a:t>Moq</a:t>
-            </a:r>
-            <a:endParaRPr lang="en-US" dirty="0"/>
+              <a:t>Unit testing  with Xunit.net &amp; Moq</a:t>
+            </a:r>
           </a:p>
         </p:txBody>
       </p:sp>
@@ -11046,13 +11014,8 @@
           <a:p>
             <a:r>
               <a:rPr lang="en-US" dirty="0"/>
-              <a:t>Unit testing  with Xunit.net &amp; </a:t>
-            </a:r>
-            <a:r>
-              <a:rPr lang="en-US" dirty="0" err="1"/>
-              <a:t>Moq</a:t>
-            </a:r>
-            <a:endParaRPr lang="en-US" dirty="0"/>
+              <a:t>Unit testing  with Xunit.net &amp; Moq</a:t>
+            </a:r>
           </a:p>
         </p:txBody>
       </p:sp>
@@ -11118,10 +11081,10 @@
       </p:grpSpPr>
       <p:sp>
         <p:nvSpPr>
-          <p:cNvPr id="7" name="Title 6">
-            <a:extLst>
-              <a:ext uri="{FF2B5EF4-FFF2-40B4-BE49-F238E27FC236}">
-                <a16:creationId xmlns:a16="http://schemas.microsoft.com/office/drawing/2014/main" id="{22146FF1-8758-577F-A57A-9F1219849CBA}"/>
+          <p:cNvPr id="2" name="Title 1">
+            <a:extLst>
+              <a:ext uri="{FF2B5EF4-FFF2-40B4-BE49-F238E27FC236}">
+                <a16:creationId xmlns:a16="http://schemas.microsoft.com/office/drawing/2014/main" id="{421C3591-CFE4-19C3-3800-C740B7949603}"/>
               </a:ext>
             </a:extLst>
           </p:cNvPr>
@@ -11134,8 +11097,41 @@
         </p:nvSpPr>
         <p:spPr>
           <a:xfrm>
-            <a:off x="6909485" y="690691"/>
-            <a:ext cx="3596590" cy="1909763"/>
+            <a:off x="5476875" y="1303637"/>
+            <a:ext cx="5111750" cy="553481"/>
+          </a:xfrm>
+        </p:spPr>
+        <p:txBody>
+          <a:bodyPr/>
+          <a:lstStyle/>
+          <a:p>
+            <a:r>
+              <a:rPr lang="en-US" dirty="0"/>
+              <a:t>What's Moq?</a:t>
+            </a:r>
+          </a:p>
+        </p:txBody>
+      </p:sp>
+      <p:sp>
+        <p:nvSpPr>
+          <p:cNvPr id="3" name="Text Placeholder 2">
+            <a:extLst>
+              <a:ext uri="{FF2B5EF4-FFF2-40B4-BE49-F238E27FC236}">
+                <a16:creationId xmlns:a16="http://schemas.microsoft.com/office/drawing/2014/main" id="{CAD990F4-927A-7B4D-64DB-BEC37B461656}"/>
+              </a:ext>
+            </a:extLst>
+          </p:cNvPr>
+          <p:cNvSpPr>
+            <a:spLocks noGrp="1"/>
+          </p:cNvSpPr>
+          <p:nvPr>
+            <p:ph type="body" idx="1"/>
+          </p:nvPr>
+        </p:nvSpPr>
+        <p:spPr>
+          <a:xfrm>
+            <a:off x="5476875" y="2230395"/>
+            <a:ext cx="5111750" cy="3478427"/>
           </a:xfrm>
         </p:spPr>
         <p:txBody>
@@ -11144,9 +11140,103 @@
           </a:bodyPr>
           <a:lstStyle/>
           <a:p>
-            <a:r>
-              <a:rPr lang="en-US" sz="3600" dirty="0"/>
-              <a:t>DEMOS</a:t>
+            <a:pPr marL="285750" indent="-285750">
+              <a:buFont typeface="Arial" panose="020B0604020202020204" pitchFamily="34" charset="0"/>
+              <a:buChar char="•"/>
+            </a:pPr>
+            <a:r>
+              <a:rPr lang="en-US" dirty="0"/>
+              <a:t>Simplified Syntax</a:t>
+            </a:r>
+          </a:p>
+          <a:p>
+            <a:pPr marL="285750" indent="-285750">
+              <a:buFont typeface="Arial" panose="020B0604020202020204" pitchFamily="34" charset="0"/>
+              <a:buChar char="•"/>
+            </a:pPr>
+            <a:r>
+              <a:rPr lang="en-US" dirty="0"/>
+              <a:t>Lambda Expressions</a:t>
+            </a:r>
+          </a:p>
+          <a:p>
+            <a:pPr marL="285750" indent="-285750">
+              <a:buFont typeface="Arial" panose="020B0604020202020204" pitchFamily="34" charset="0"/>
+              <a:buChar char="•"/>
+            </a:pPr>
+            <a:r>
+              <a:rPr lang="en-US" dirty="0"/>
+              <a:t>No Interface Requirements</a:t>
+            </a:r>
+          </a:p>
+          <a:p>
+            <a:pPr marL="285750" indent="-285750">
+              <a:buFont typeface="Arial" panose="020B0604020202020204" pitchFamily="34" charset="0"/>
+              <a:buChar char="•"/>
+            </a:pPr>
+            <a:r>
+              <a:rPr lang="en-US" dirty="0"/>
+              <a:t>Strict Mocking by Default</a:t>
+            </a:r>
+          </a:p>
+          <a:p>
+            <a:pPr marL="285750" indent="-285750">
+              <a:buFont typeface="Arial" panose="020B0604020202020204" pitchFamily="34" charset="0"/>
+              <a:buChar char="•"/>
+            </a:pPr>
+            <a:r>
+              <a:rPr lang="en-US" dirty="0"/>
+              <a:t>Partial Mocking</a:t>
+            </a:r>
+          </a:p>
+          <a:p>
+            <a:pPr marL="285750" indent="-285750">
+              <a:buFont typeface="Arial" panose="020B0604020202020204" pitchFamily="34" charset="0"/>
+              <a:buChar char="•"/>
+            </a:pPr>
+            <a:r>
+              <a:rPr lang="en-US" dirty="0"/>
+              <a:t>Seamless Integration</a:t>
+            </a:r>
+          </a:p>
+          <a:p>
+            <a:pPr marL="285750" indent="-285750">
+              <a:buFont typeface="Arial" panose="020B0604020202020204" pitchFamily="34" charset="0"/>
+              <a:buChar char="•"/>
+            </a:pPr>
+            <a:r>
+              <a:rPr lang="en-US" dirty="0"/>
+              <a:t>Verification of Calls</a:t>
+            </a:r>
+          </a:p>
+          <a:p>
+            <a:pPr marL="285750" indent="-285750">
+              <a:buFont typeface="Arial" panose="020B0604020202020204" pitchFamily="34" charset="0"/>
+              <a:buChar char="•"/>
+            </a:pPr>
+            <a:r>
+              <a:rPr lang="en-US" dirty="0"/>
+              <a:t>No Need for Record and Replay</a:t>
+            </a:r>
+          </a:p>
+          <a:p>
+            <a:pPr marL="285750" indent="-285750">
+              <a:buFont typeface="Arial" panose="020B0604020202020204" pitchFamily="34" charset="0"/>
+              <a:buChar char="•"/>
+            </a:pPr>
+            <a:r>
+              <a:rPr lang="en-US" dirty="0"/>
+              <a:t>Strong Community Support</a:t>
+            </a:r>
+          </a:p>
+          <a:p>
+            <a:pPr marL="285750" indent="-285750">
+              <a:buFont typeface="Arial" panose="020B0604020202020204" pitchFamily="34" charset="0"/>
+              <a:buChar char="•"/>
+            </a:pPr>
+            <a:r>
+              <a:rPr lang="en-US" dirty="0"/>
+              <a:t>Readability and Maintainability</a:t>
             </a:r>
           </a:p>
         </p:txBody>
@@ -11156,7 +11246,7 @@
           <p:cNvPr id="4" name="Date Placeholder 3">
             <a:extLst>
               <a:ext uri="{FF2B5EF4-FFF2-40B4-BE49-F238E27FC236}">
-                <a16:creationId xmlns:a16="http://schemas.microsoft.com/office/drawing/2014/main" id="{98DED095-5FE1-470E-1ABF-9B2A767B5C4F}"/>
+                <a16:creationId xmlns:a16="http://schemas.microsoft.com/office/drawing/2014/main" id="{205F9160-F798-4B99-7E36-7629FD7568C3}"/>
               </a:ext>
             </a:extLst>
           </p:cNvPr>
@@ -11173,10 +11263,9 @@
           <a:lstStyle/>
           <a:p>
             <a:r>
-              <a:rPr lang="en-US"/>
-              <a:t>20XX</a:t>
-            </a:r>
-            <a:endParaRPr lang="en-US" dirty="0"/>
+              <a:rPr lang="en-US" dirty="0"/>
+              <a:t>2023</a:t>
+            </a:r>
           </a:p>
         </p:txBody>
       </p:sp>
@@ -11185,7 +11274,7 @@
           <p:cNvPr id="5" name="Footer Placeholder 4">
             <a:extLst>
               <a:ext uri="{FF2B5EF4-FFF2-40B4-BE49-F238E27FC236}">
-                <a16:creationId xmlns:a16="http://schemas.microsoft.com/office/drawing/2014/main" id="{0BA995A7-77A9-23AF-0167-3F94186DA1C6}"/>
+                <a16:creationId xmlns:a16="http://schemas.microsoft.com/office/drawing/2014/main" id="{5AFD9DB7-BE03-6FA0-E368-3AE30AE13F18}"/>
               </a:ext>
             </a:extLst>
           </p:cNvPr>
@@ -11202,10 +11291,9 @@
           <a:lstStyle/>
           <a:p>
             <a:r>
-              <a:rPr lang="en-US"/>
-              <a:t>PRESENTATION TITLE</a:t>
-            </a:r>
-            <a:endParaRPr lang="en-US" dirty="0"/>
+              <a:rPr lang="en-US" dirty="0"/>
+              <a:t>Unit testing  with Xunit.net &amp; Moq</a:t>
+            </a:r>
           </a:p>
         </p:txBody>
       </p:sp>
@@ -11214,7 +11302,7 @@
           <p:cNvPr id="6" name="Slide Number Placeholder 5">
             <a:extLst>
               <a:ext uri="{FF2B5EF4-FFF2-40B4-BE49-F238E27FC236}">
-                <a16:creationId xmlns:a16="http://schemas.microsoft.com/office/drawing/2014/main" id="{E0B7FA38-FFCF-95C3-8C11-C57798C0B720}"/>
+                <a16:creationId xmlns:a16="http://schemas.microsoft.com/office/drawing/2014/main" id="{1593F57E-B6AE-B9E5-EB77-283BA94280E1}"/>
               </a:ext>
             </a:extLst>
           </p:cNvPr>
@@ -11234,6 +11322,159 @@
               <a:rPr lang="en-US" smtClean="0"/>
               <a:pPr/>
               <a:t>7</a:t>
+            </a:fld>
+            <a:endParaRPr lang="en-US" dirty="0"/>
+          </a:p>
+        </p:txBody>
+      </p:sp>
+    </p:spTree>
+    <p:extLst>
+      <p:ext uri="{BB962C8B-B14F-4D97-AF65-F5344CB8AC3E}">
+        <p14:creationId xmlns:p14="http://schemas.microsoft.com/office/powerpoint/2010/main" val="2834305372"/>
+      </p:ext>
+    </p:extLst>
+  </p:cSld>
+  <p:clrMapOvr>
+    <a:masterClrMapping/>
+  </p:clrMapOvr>
+</p:sld>
+</file>
+
+<file path=ppt/slides/slide8.xml><?xml version="1.0" encoding="utf-8"?>
+<p:sld xmlns:a="http://schemas.openxmlformats.org/drawingml/2006/main" xmlns:r="http://schemas.openxmlformats.org/officeDocument/2006/relationships" xmlns:p="http://schemas.openxmlformats.org/presentationml/2006/main">
+  <p:cSld>
+    <p:spTree>
+      <p:nvGrpSpPr>
+        <p:cNvPr id="1" name=""/>
+        <p:cNvGrpSpPr/>
+        <p:nvPr/>
+      </p:nvGrpSpPr>
+      <p:grpSpPr>
+        <a:xfrm>
+          <a:off x="0" y="0"/>
+          <a:ext cx="0" cy="0"/>
+          <a:chOff x="0" y="0"/>
+          <a:chExt cx="0" cy="0"/>
+        </a:xfrm>
+      </p:grpSpPr>
+      <p:sp>
+        <p:nvSpPr>
+          <p:cNvPr id="7" name="Title 6">
+            <a:extLst>
+              <a:ext uri="{FF2B5EF4-FFF2-40B4-BE49-F238E27FC236}">
+                <a16:creationId xmlns:a16="http://schemas.microsoft.com/office/drawing/2014/main" id="{22146FF1-8758-577F-A57A-9F1219849CBA}"/>
+              </a:ext>
+            </a:extLst>
+          </p:cNvPr>
+          <p:cNvSpPr>
+            <a:spLocks noGrp="1"/>
+          </p:cNvSpPr>
+          <p:nvPr>
+            <p:ph type="title"/>
+          </p:nvPr>
+        </p:nvSpPr>
+        <p:spPr>
+          <a:xfrm>
+            <a:off x="6909485" y="690691"/>
+            <a:ext cx="3596590" cy="1909763"/>
+          </a:xfrm>
+        </p:spPr>
+        <p:txBody>
+          <a:bodyPr>
+            <a:normAutofit/>
+          </a:bodyPr>
+          <a:lstStyle/>
+          <a:p>
+            <a:r>
+              <a:rPr lang="en-US" sz="3600" dirty="0"/>
+              <a:t>DEMOS</a:t>
+            </a:r>
+          </a:p>
+        </p:txBody>
+      </p:sp>
+      <p:sp>
+        <p:nvSpPr>
+          <p:cNvPr id="4" name="Date Placeholder 3">
+            <a:extLst>
+              <a:ext uri="{FF2B5EF4-FFF2-40B4-BE49-F238E27FC236}">
+                <a16:creationId xmlns:a16="http://schemas.microsoft.com/office/drawing/2014/main" id="{98DED095-5FE1-470E-1ABF-9B2A767B5C4F}"/>
+              </a:ext>
+            </a:extLst>
+          </p:cNvPr>
+          <p:cNvSpPr>
+            <a:spLocks noGrp="1"/>
+          </p:cNvSpPr>
+          <p:nvPr>
+            <p:ph type="dt" sz="half" idx="10"/>
+          </p:nvPr>
+        </p:nvSpPr>
+        <p:spPr/>
+        <p:txBody>
+          <a:bodyPr/>
+          <a:lstStyle/>
+          <a:p>
+            <a:r>
+              <a:rPr lang="en-US"/>
+              <a:t>20XX</a:t>
+            </a:r>
+            <a:endParaRPr lang="en-US" dirty="0"/>
+          </a:p>
+        </p:txBody>
+      </p:sp>
+      <p:sp>
+        <p:nvSpPr>
+          <p:cNvPr id="5" name="Footer Placeholder 4">
+            <a:extLst>
+              <a:ext uri="{FF2B5EF4-FFF2-40B4-BE49-F238E27FC236}">
+                <a16:creationId xmlns:a16="http://schemas.microsoft.com/office/drawing/2014/main" id="{0BA995A7-77A9-23AF-0167-3F94186DA1C6}"/>
+              </a:ext>
+            </a:extLst>
+          </p:cNvPr>
+          <p:cNvSpPr>
+            <a:spLocks noGrp="1"/>
+          </p:cNvSpPr>
+          <p:nvPr>
+            <p:ph type="ftr" sz="quarter" idx="11"/>
+          </p:nvPr>
+        </p:nvSpPr>
+        <p:spPr/>
+        <p:txBody>
+          <a:bodyPr/>
+          <a:lstStyle/>
+          <a:p>
+            <a:r>
+              <a:rPr lang="en-US"/>
+              <a:t>PRESENTATION TITLE</a:t>
+            </a:r>
+            <a:endParaRPr lang="en-US" dirty="0"/>
+          </a:p>
+        </p:txBody>
+      </p:sp>
+      <p:sp>
+        <p:nvSpPr>
+          <p:cNvPr id="6" name="Slide Number Placeholder 5">
+            <a:extLst>
+              <a:ext uri="{FF2B5EF4-FFF2-40B4-BE49-F238E27FC236}">
+                <a16:creationId xmlns:a16="http://schemas.microsoft.com/office/drawing/2014/main" id="{E0B7FA38-FFCF-95C3-8C11-C57798C0B720}"/>
+              </a:ext>
+            </a:extLst>
+          </p:cNvPr>
+          <p:cNvSpPr>
+            <a:spLocks noGrp="1"/>
+          </p:cNvSpPr>
+          <p:nvPr>
+            <p:ph type="sldNum" sz="quarter" idx="12"/>
+          </p:nvPr>
+        </p:nvSpPr>
+        <p:spPr/>
+        <p:txBody>
+          <a:bodyPr/>
+          <a:lstStyle/>
+          <a:p>
+            <a:fld id="{A49DFD55-3C28-40EF-9E31-A92D2E4017FF}" type="slidenum">
+              <a:rPr lang="en-US" smtClean="0"/>
+              <a:pPr/>
+              <a:t>8</a:t>
             </a:fld>
             <a:endParaRPr lang="en-US" dirty="0"/>
           </a:p>
@@ -12044,22 +12285,12 @@
 </file>
 
 <file path=customXml/item1.xml><?xml version="1.0" encoding="utf-8"?>
-<p:properties xmlns:p="http://schemas.microsoft.com/office/2006/metadata/properties" xmlns:xsi="http://www.w3.org/2001/XMLSchema-instance" xmlns:pc="http://schemas.microsoft.com/office/infopath/2007/PartnerControls">
-  <documentManagement>
-    <_ip_UnifiedCompliancePolicyUIAction xmlns="http://schemas.microsoft.com/sharepoint/v3" xsi:nil="true"/>
-    <Image xmlns="71af3243-3dd4-4a8d-8c0d-dd76da1f02a5">
-      <Url xsi:nil="true"/>
-      <Description xsi:nil="true"/>
-    </Image>
-    <Status xmlns="71af3243-3dd4-4a8d-8c0d-dd76da1f02a5">Not started</Status>
-    <_ip_UnifiedCompliancePolicyProperties xmlns="http://schemas.microsoft.com/sharepoint/v3" xsi:nil="true"/>
-    <ImageTagsTaxHTField xmlns="71af3243-3dd4-4a8d-8c0d-dd76da1f02a5">
-      <Terms xmlns="http://schemas.microsoft.com/office/infopath/2007/PartnerControls"/>
-    </ImageTagsTaxHTField>
-    <TaxCatchAll xmlns="230e9df3-be65-4c73-a93b-d1236ebd677e"/>
-    <MediaServiceKeyPoints xmlns="71af3243-3dd4-4a8d-8c0d-dd76da1f02a5" xsi:nil="true"/>
-  </documentManagement>
-</p:properties>
+<?mso-contentType ?>
+<FormTemplates xmlns="http://schemas.microsoft.com/sharepoint/v3/contenttype/forms">
+  <Display>DocumentLibraryForm</Display>
+  <Edit>DocumentLibraryForm</Edit>
+  <New>DocumentLibraryForm</New>
+</FormTemplates>
 </file>
 
 <file path=customXml/item2.xml><?xml version="1.0" encoding="utf-8"?>
@@ -12339,22 +12570,28 @@
 </file>
 
 <file path=customXml/item3.xml><?xml version="1.0" encoding="utf-8"?>
-<?mso-contentType ?>
-<FormTemplates xmlns="http://schemas.microsoft.com/sharepoint/v3/contenttype/forms">
-  <Display>DocumentLibraryForm</Display>
-  <Edit>DocumentLibraryForm</Edit>
-  <New>DocumentLibraryForm</New>
-</FormTemplates>
+<p:properties xmlns:p="http://schemas.microsoft.com/office/2006/metadata/properties" xmlns:xsi="http://www.w3.org/2001/XMLSchema-instance" xmlns:pc="http://schemas.microsoft.com/office/infopath/2007/PartnerControls">
+  <documentManagement>
+    <_ip_UnifiedCompliancePolicyUIAction xmlns="http://schemas.microsoft.com/sharepoint/v3" xsi:nil="true"/>
+    <Image xmlns="71af3243-3dd4-4a8d-8c0d-dd76da1f02a5">
+      <Url xsi:nil="true"/>
+      <Description xsi:nil="true"/>
+    </Image>
+    <Status xmlns="71af3243-3dd4-4a8d-8c0d-dd76da1f02a5">Not started</Status>
+    <_ip_UnifiedCompliancePolicyProperties xmlns="http://schemas.microsoft.com/sharepoint/v3" xsi:nil="true"/>
+    <ImageTagsTaxHTField xmlns="71af3243-3dd4-4a8d-8c0d-dd76da1f02a5">
+      <Terms xmlns="http://schemas.microsoft.com/office/infopath/2007/PartnerControls"/>
+    </ImageTagsTaxHTField>
+    <TaxCatchAll xmlns="230e9df3-be65-4c73-a93b-d1236ebd677e"/>
+    <MediaServiceKeyPoints xmlns="71af3243-3dd4-4a8d-8c0d-dd76da1f02a5" xsi:nil="true"/>
+  </documentManagement>
+</p:properties>
 </file>
 
 <file path=customXml/itemProps1.xml><?xml version="1.0" encoding="utf-8"?>
-<ds:datastoreItem xmlns:ds="http://schemas.openxmlformats.org/officeDocument/2006/customXml" ds:itemID="{29C43685-694E-4579-B109-3C418D49DA65}">
+<ds:datastoreItem xmlns:ds="http://schemas.openxmlformats.org/officeDocument/2006/customXml" ds:itemID="{0FD6FE22-81A0-4500-AFD0-342D21BB9A2C}">
   <ds:schemaRefs>
-    <ds:schemaRef ds:uri="http://schemas.microsoft.com/office/2006/metadata/properties"/>
-    <ds:schemaRef ds:uri="http://schemas.microsoft.com/office/infopath/2007/PartnerControls"/>
-    <ds:schemaRef ds:uri="http://schemas.microsoft.com/sharepoint/v3"/>
-    <ds:schemaRef ds:uri="71af3243-3dd4-4a8d-8c0d-dd76da1f02a5"/>
-    <ds:schemaRef ds:uri="230e9df3-be65-4c73-a93b-d1236ebd677e"/>
+    <ds:schemaRef ds:uri="http://schemas.microsoft.com/sharepoint/v3/contenttype/forms"/>
   </ds:schemaRefs>
 </ds:datastoreItem>
 </file>
@@ -12381,9 +12618,13 @@
 </file>
 
 <file path=customXml/itemProps3.xml><?xml version="1.0" encoding="utf-8"?>
-<ds:datastoreItem xmlns:ds="http://schemas.openxmlformats.org/officeDocument/2006/customXml" ds:itemID="{0FD6FE22-81A0-4500-AFD0-342D21BB9A2C}">
+<ds:datastoreItem xmlns:ds="http://schemas.openxmlformats.org/officeDocument/2006/customXml" ds:itemID="{29C43685-694E-4579-B109-3C418D49DA65}">
   <ds:schemaRefs>
-    <ds:schemaRef ds:uri="http://schemas.microsoft.com/sharepoint/v3/contenttype/forms"/>
+    <ds:schemaRef ds:uri="http://schemas.microsoft.com/office/2006/metadata/properties"/>
+    <ds:schemaRef ds:uri="http://schemas.microsoft.com/office/infopath/2007/PartnerControls"/>
+    <ds:schemaRef ds:uri="http://schemas.microsoft.com/sharepoint/v3"/>
+    <ds:schemaRef ds:uri="71af3243-3dd4-4a8d-8c0d-dd76da1f02a5"/>
+    <ds:schemaRef ds:uri="230e9df3-be65-4c73-a93b-d1236ebd677e"/>
   </ds:schemaRefs>
 </ds:datastoreItem>
 </file>

</xml_diff>

<commit_message>
Updated presentation to include notes for a couple of slides
</commit_message>
<xml_diff>
--- a/Presentation/Unit Testing with Xunit - Moq.pptx
+++ b/Presentation/Unit Testing with Xunit - Moq.pptx
@@ -383,7 +383,7 @@
           <a:p>
             <a:fld id="{B56F32FC-4BD9-442A-A8C6-51598C909FE3}" type="datetimeFigureOut">
               <a:rPr lang="en-US" smtClean="0"/>
-              <a:t>7/27/2023</a:t>
+              <a:t>8/7/2023</a:t>
             </a:fld>
             <a:endParaRPr lang="en-US" dirty="0"/>
           </a:p>
@@ -560,7 +560,7 @@
           <a:p>
             <a:fld id="{056371FA-A98D-41E8-93F4-09945841298A}" type="datetimeFigureOut">
               <a:rPr lang="en-US" smtClean="0"/>
-              <a:t>7/27/2023</a:t>
+              <a:t>8/7/2023</a:t>
             </a:fld>
             <a:endParaRPr lang="en-US" dirty="0"/>
           </a:p>
@@ -825,6 +825,535 @@
     </a:lvl9pPr>
   </p:notesStyle>
 </p:notesMaster>
+</file>
+
+<file path=ppt/notesSlides/notesSlide1.xml><?xml version="1.0" encoding="utf-8"?>
+<p:notes xmlns:a="http://schemas.openxmlformats.org/drawingml/2006/main" xmlns:r="http://schemas.openxmlformats.org/officeDocument/2006/relationships" xmlns:p="http://schemas.openxmlformats.org/presentationml/2006/main">
+  <p:cSld>
+    <p:spTree>
+      <p:nvGrpSpPr>
+        <p:cNvPr id="1" name=""/>
+        <p:cNvGrpSpPr/>
+        <p:nvPr/>
+      </p:nvGrpSpPr>
+      <p:grpSpPr>
+        <a:xfrm>
+          <a:off x="0" y="0"/>
+          <a:ext cx="0" cy="0"/>
+          <a:chOff x="0" y="0"/>
+          <a:chExt cx="0" cy="0"/>
+        </a:xfrm>
+      </p:grpSpPr>
+      <p:sp>
+        <p:nvSpPr>
+          <p:cNvPr id="2" name="Slide Image Placeholder 1"/>
+          <p:cNvSpPr>
+            <a:spLocks noGrp="1" noRot="1" noChangeAspect="1"/>
+          </p:cNvSpPr>
+          <p:nvPr>
+            <p:ph type="sldImg"/>
+          </p:nvPr>
+        </p:nvSpPr>
+        <p:spPr/>
+      </p:sp>
+      <p:sp>
+        <p:nvSpPr>
+          <p:cNvPr id="3" name="Notes Placeholder 2"/>
+          <p:cNvSpPr>
+            <a:spLocks noGrp="1"/>
+          </p:cNvSpPr>
+          <p:nvPr>
+            <p:ph type="body" idx="1"/>
+          </p:nvPr>
+        </p:nvSpPr>
+        <p:spPr/>
+        <p:txBody>
+          <a:bodyPr/>
+          <a:lstStyle/>
+          <a:p>
+            <a:endParaRPr lang="en-US" dirty="0"/>
+          </a:p>
+        </p:txBody>
+      </p:sp>
+      <p:sp>
+        <p:nvSpPr>
+          <p:cNvPr id="4" name="Slide Number Placeholder 3"/>
+          <p:cNvSpPr>
+            <a:spLocks noGrp="1"/>
+          </p:cNvSpPr>
+          <p:nvPr>
+            <p:ph type="sldNum" sz="quarter" idx="5"/>
+          </p:nvPr>
+        </p:nvSpPr>
+        <p:spPr/>
+        <p:txBody>
+          <a:bodyPr/>
+          <a:lstStyle/>
+          <a:p>
+            <a:fld id="{22289C57-55D7-40A4-A101-E74FAC7A092B}" type="slidenum">
+              <a:rPr lang="en-US" smtClean="0"/>
+              <a:t>1</a:t>
+            </a:fld>
+            <a:endParaRPr lang="en-US" dirty="0"/>
+          </a:p>
+        </p:txBody>
+      </p:sp>
+    </p:spTree>
+    <p:extLst>
+      <p:ext uri="{BB962C8B-B14F-4D97-AF65-F5344CB8AC3E}">
+        <p14:creationId xmlns:p14="http://schemas.microsoft.com/office/powerpoint/2010/main" val="1308919053"/>
+      </p:ext>
+    </p:extLst>
+  </p:cSld>
+  <p:clrMapOvr>
+    <a:masterClrMapping/>
+  </p:clrMapOvr>
+</p:notes>
+</file>
+
+<file path=ppt/notesSlides/notesSlide2.xml><?xml version="1.0" encoding="utf-8"?>
+<p:notes xmlns:a="http://schemas.openxmlformats.org/drawingml/2006/main" xmlns:r="http://schemas.openxmlformats.org/officeDocument/2006/relationships" xmlns:p="http://schemas.openxmlformats.org/presentationml/2006/main">
+  <p:cSld>
+    <p:spTree>
+      <p:nvGrpSpPr>
+        <p:cNvPr id="1" name=""/>
+        <p:cNvGrpSpPr/>
+        <p:nvPr/>
+      </p:nvGrpSpPr>
+      <p:grpSpPr>
+        <a:xfrm>
+          <a:off x="0" y="0"/>
+          <a:ext cx="0" cy="0"/>
+          <a:chOff x="0" y="0"/>
+          <a:chExt cx="0" cy="0"/>
+        </a:xfrm>
+      </p:grpSpPr>
+      <p:sp>
+        <p:nvSpPr>
+          <p:cNvPr id="2" name="Slide Image Placeholder 1"/>
+          <p:cNvSpPr>
+            <a:spLocks noGrp="1" noRot="1" noChangeAspect="1"/>
+          </p:cNvSpPr>
+          <p:nvPr>
+            <p:ph type="sldImg"/>
+          </p:nvPr>
+        </p:nvSpPr>
+        <p:spPr/>
+      </p:sp>
+      <p:sp>
+        <p:nvSpPr>
+          <p:cNvPr id="3" name="Notes Placeholder 2"/>
+          <p:cNvSpPr>
+            <a:spLocks noGrp="1"/>
+          </p:cNvSpPr>
+          <p:nvPr>
+            <p:ph type="body" idx="1"/>
+          </p:nvPr>
+        </p:nvSpPr>
+        <p:spPr/>
+        <p:txBody>
+          <a:bodyPr/>
+          <a:lstStyle/>
+          <a:p>
+            <a:pPr marL="0" marR="0" lvl="0" indent="0" algn="l" defTabSz="914400" rtl="0" eaLnBrk="1" fontAlgn="auto" latinLnBrk="0" hangingPunct="1">
+              <a:lnSpc>
+                <a:spcPct val="100000"/>
+              </a:lnSpc>
+              <a:spcBef>
+                <a:spcPts val="0"/>
+              </a:spcBef>
+              <a:spcAft>
+                <a:spcPts val="0"/>
+              </a:spcAft>
+              <a:buClrTx/>
+              <a:buSzTx/>
+              <a:buFontTx/>
+              <a:buNone/>
+              <a:tabLst/>
+              <a:defRPr/>
+            </a:pPr>
+            <a:r>
+              <a:rPr lang="en-US" dirty="0"/>
+              <a:t>- Allows us to </a:t>
+            </a:r>
+            <a:r>
+              <a:rPr lang="en-US" b="0" i="0" dirty="0">
+                <a:solidFill>
+                  <a:srgbClr val="111111"/>
+                </a:solidFill>
+                <a:effectLst/>
+                <a:latin typeface="-apple-system"/>
+              </a:rPr>
+              <a:t>save time and money.</a:t>
+            </a:r>
+          </a:p>
+          <a:p>
+            <a:pPr marL="0" marR="0" lvl="0" indent="0" algn="l" defTabSz="914400" rtl="0" eaLnBrk="1" fontAlgn="auto" latinLnBrk="0" hangingPunct="1">
+              <a:lnSpc>
+                <a:spcPct val="100000"/>
+              </a:lnSpc>
+              <a:spcBef>
+                <a:spcPts val="0"/>
+              </a:spcBef>
+              <a:spcAft>
+                <a:spcPts val="0"/>
+              </a:spcAft>
+              <a:buClrTx/>
+              <a:buSzTx/>
+              <a:buFontTx/>
+              <a:buNone/>
+              <a:tabLst/>
+              <a:defRPr/>
+            </a:pPr>
+            <a:r>
+              <a:rPr lang="en-US" b="0" i="0" dirty="0">
+                <a:solidFill>
+                  <a:srgbClr val="111111"/>
+                </a:solidFill>
+                <a:effectLst/>
+                <a:latin typeface="-apple-system"/>
+              </a:rPr>
+              <a:t>- This of course applies just for the finite possibilities that we describe on our tests.</a:t>
+            </a:r>
+          </a:p>
+          <a:p>
+            <a:pPr marL="0" marR="0" lvl="0" indent="0" algn="l" defTabSz="914400" rtl="0" eaLnBrk="1" fontAlgn="auto" latinLnBrk="0" hangingPunct="1">
+              <a:lnSpc>
+                <a:spcPct val="100000"/>
+              </a:lnSpc>
+              <a:spcBef>
+                <a:spcPts val="0"/>
+              </a:spcBef>
+              <a:spcAft>
+                <a:spcPts val="0"/>
+              </a:spcAft>
+              <a:buClrTx/>
+              <a:buSzTx/>
+              <a:buFontTx/>
+              <a:buNone/>
+              <a:tabLst/>
+              <a:defRPr/>
+            </a:pPr>
+            <a:r>
+              <a:rPr lang="en-US" b="0" i="0" dirty="0">
+                <a:solidFill>
+                  <a:srgbClr val="111111"/>
+                </a:solidFill>
+                <a:effectLst/>
+                <a:latin typeface="-apple-system"/>
+              </a:rPr>
+              <a:t>- Confidence gives us the ability to refactor while corroborating that functionalities are kept on the same levels as describes on our tests.</a:t>
+            </a:r>
+          </a:p>
+          <a:p>
+            <a:pPr marL="0" marR="0" lvl="0" indent="0" algn="l" defTabSz="914400" rtl="0" eaLnBrk="1" fontAlgn="auto" latinLnBrk="0" hangingPunct="1">
+              <a:lnSpc>
+                <a:spcPct val="100000"/>
+              </a:lnSpc>
+              <a:spcBef>
+                <a:spcPts val="0"/>
+              </a:spcBef>
+              <a:spcAft>
+                <a:spcPts val="0"/>
+              </a:spcAft>
+              <a:buClrTx/>
+              <a:buSzTx/>
+              <a:buFontTx/>
+              <a:buNone/>
+              <a:tabLst/>
+              <a:defRPr/>
+            </a:pPr>
+            <a:r>
+              <a:rPr lang="en-US" b="0" i="0" dirty="0">
+                <a:solidFill>
+                  <a:srgbClr val="111111"/>
+                </a:solidFill>
+                <a:effectLst/>
+                <a:latin typeface="-apple-system"/>
+              </a:rPr>
+              <a:t>- Tests can describe usages of unis of code, it can also imply unforeseeable scenarios, which could happen when we find ways the source behave, and we find no documented tests showing considerations of this usages.</a:t>
+            </a:r>
+          </a:p>
+          <a:p>
+            <a:pPr marL="0" marR="0" lvl="0" indent="0" algn="l" defTabSz="914400" rtl="0" eaLnBrk="1" fontAlgn="auto" latinLnBrk="0" hangingPunct="1">
+              <a:lnSpc>
+                <a:spcPct val="100000"/>
+              </a:lnSpc>
+              <a:spcBef>
+                <a:spcPts val="0"/>
+              </a:spcBef>
+              <a:spcAft>
+                <a:spcPts val="0"/>
+              </a:spcAft>
+              <a:buClrTx/>
+              <a:buSzTx/>
+              <a:buFontTx/>
+              <a:buNone/>
+              <a:tabLst/>
+              <a:defRPr/>
+            </a:pPr>
+            <a:r>
+              <a:rPr lang="en-US" b="0" i="0" dirty="0">
+                <a:solidFill>
+                  <a:srgbClr val="111111"/>
+                </a:solidFill>
+                <a:effectLst/>
+                <a:latin typeface="-apple-system"/>
+              </a:rPr>
+              <a:t>- All code has bugs; we want to identify them as quickly as possible in the development lifecycle.</a:t>
+            </a:r>
+          </a:p>
+          <a:p>
+            <a:pPr marL="0" marR="0" lvl="0" indent="0" algn="l" defTabSz="914400" rtl="0" eaLnBrk="1" fontAlgn="auto" latinLnBrk="0" hangingPunct="1">
+              <a:lnSpc>
+                <a:spcPct val="100000"/>
+              </a:lnSpc>
+              <a:spcBef>
+                <a:spcPts val="0"/>
+              </a:spcBef>
+              <a:spcAft>
+                <a:spcPts val="0"/>
+              </a:spcAft>
+              <a:buClrTx/>
+              <a:buSzTx/>
+              <a:buFontTx/>
+              <a:buNone/>
+              <a:tabLst/>
+              <a:defRPr/>
+            </a:pPr>
+            <a:r>
+              <a:rPr lang="en-US" b="0" i="0" dirty="0">
+                <a:solidFill>
+                  <a:srgbClr val="111111"/>
+                </a:solidFill>
+                <a:effectLst/>
+                <a:latin typeface="-apple-system"/>
+              </a:rPr>
+              <a:t>- As we iterate adding more scenarios and coverage on our tests, the trust on the code increases, this makes it easier to understand the impact of new features.</a:t>
+            </a:r>
+          </a:p>
+          <a:p>
+            <a:pPr marL="0" marR="0" lvl="0" indent="0" algn="l" defTabSz="914400" rtl="0" eaLnBrk="1" fontAlgn="auto" latinLnBrk="0" hangingPunct="1">
+              <a:lnSpc>
+                <a:spcPct val="100000"/>
+              </a:lnSpc>
+              <a:spcBef>
+                <a:spcPts val="0"/>
+              </a:spcBef>
+              <a:spcAft>
+                <a:spcPts val="0"/>
+              </a:spcAft>
+              <a:buClrTx/>
+              <a:buSzTx/>
+              <a:buFontTx/>
+              <a:buNone/>
+              <a:tabLst/>
+              <a:defRPr/>
+            </a:pPr>
+            <a:endParaRPr lang="en-US" b="0" i="0" dirty="0">
+              <a:solidFill>
+                <a:srgbClr val="111111"/>
+              </a:solidFill>
+              <a:effectLst/>
+              <a:latin typeface="-apple-system"/>
+            </a:endParaRPr>
+          </a:p>
+          <a:p>
+            <a:endParaRPr lang="en-US" dirty="0"/>
+          </a:p>
+        </p:txBody>
+      </p:sp>
+      <p:sp>
+        <p:nvSpPr>
+          <p:cNvPr id="4" name="Slide Number Placeholder 3"/>
+          <p:cNvSpPr>
+            <a:spLocks noGrp="1"/>
+          </p:cNvSpPr>
+          <p:nvPr>
+            <p:ph type="sldNum" sz="quarter" idx="5"/>
+          </p:nvPr>
+        </p:nvSpPr>
+        <p:spPr/>
+        <p:txBody>
+          <a:bodyPr/>
+          <a:lstStyle/>
+          <a:p>
+            <a:fld id="{22289C57-55D7-40A4-A101-E74FAC7A092B}" type="slidenum">
+              <a:rPr lang="en-US" smtClean="0"/>
+              <a:t>3</a:t>
+            </a:fld>
+            <a:endParaRPr lang="en-US" dirty="0"/>
+          </a:p>
+        </p:txBody>
+      </p:sp>
+    </p:spTree>
+    <p:extLst>
+      <p:ext uri="{BB962C8B-B14F-4D97-AF65-F5344CB8AC3E}">
+        <p14:creationId xmlns:p14="http://schemas.microsoft.com/office/powerpoint/2010/main" val="2894134210"/>
+      </p:ext>
+    </p:extLst>
+  </p:cSld>
+  <p:clrMapOvr>
+    <a:masterClrMapping/>
+  </p:clrMapOvr>
+</p:notes>
+</file>
+
+<file path=ppt/notesSlides/notesSlide3.xml><?xml version="1.0" encoding="utf-8"?>
+<p:notes xmlns:a="http://schemas.openxmlformats.org/drawingml/2006/main" xmlns:r="http://schemas.openxmlformats.org/officeDocument/2006/relationships" xmlns:p="http://schemas.openxmlformats.org/presentationml/2006/main">
+  <p:cSld>
+    <p:spTree>
+      <p:nvGrpSpPr>
+        <p:cNvPr id="1" name=""/>
+        <p:cNvGrpSpPr/>
+        <p:nvPr/>
+      </p:nvGrpSpPr>
+      <p:grpSpPr>
+        <a:xfrm>
+          <a:off x="0" y="0"/>
+          <a:ext cx="0" cy="0"/>
+          <a:chOff x="0" y="0"/>
+          <a:chExt cx="0" cy="0"/>
+        </a:xfrm>
+      </p:grpSpPr>
+      <p:sp>
+        <p:nvSpPr>
+          <p:cNvPr id="2" name="Slide Image Placeholder 1"/>
+          <p:cNvSpPr>
+            <a:spLocks noGrp="1" noRot="1" noChangeAspect="1"/>
+          </p:cNvSpPr>
+          <p:nvPr>
+            <p:ph type="sldImg"/>
+          </p:nvPr>
+        </p:nvSpPr>
+        <p:spPr/>
+      </p:sp>
+      <p:sp>
+        <p:nvSpPr>
+          <p:cNvPr id="3" name="Notes Placeholder 2"/>
+          <p:cNvSpPr>
+            <a:spLocks noGrp="1"/>
+          </p:cNvSpPr>
+          <p:nvPr>
+            <p:ph type="body" idx="1"/>
+          </p:nvPr>
+        </p:nvSpPr>
+        <p:spPr/>
+        <p:txBody>
+          <a:bodyPr/>
+          <a:lstStyle/>
+          <a:p>
+            <a:r>
+              <a:rPr lang="en-US" dirty="0"/>
+              <a:t>- Aside from most of the core dotnet/</a:t>
+            </a:r>
+            <a:r>
+              <a:rPr lang="en-US" dirty="0" err="1"/>
+              <a:t>roslyn</a:t>
+            </a:r>
+            <a:r>
+              <a:rPr lang="en-US" dirty="0"/>
+              <a:t> team, a bunch of Open-source libraries like Dapper, </a:t>
+            </a:r>
+            <a:r>
+              <a:rPr lang="en-US" dirty="0" err="1"/>
+              <a:t>Hangfire</a:t>
+            </a:r>
+            <a:r>
+              <a:rPr lang="en-US" dirty="0"/>
+              <a:t>, </a:t>
+            </a:r>
+            <a:r>
+              <a:rPr lang="en-US" dirty="0" err="1"/>
+              <a:t>RavenDb</a:t>
+            </a:r>
+            <a:r>
+              <a:rPr lang="en-US" dirty="0"/>
+              <a:t>, </a:t>
+            </a:r>
+            <a:r>
+              <a:rPr lang="en-US" dirty="0" err="1"/>
+              <a:t>StackExchangeRedis</a:t>
+            </a:r>
+            <a:r>
+              <a:rPr lang="en-US" dirty="0"/>
+              <a:t>, </a:t>
+            </a:r>
+            <a:r>
+              <a:rPr lang="en-US" dirty="0" err="1"/>
+              <a:t>Newtonsoft.Json</a:t>
+            </a:r>
+            <a:r>
+              <a:rPr lang="en-US" dirty="0"/>
+              <a:t> use </a:t>
+            </a:r>
+            <a:r>
+              <a:rPr lang="en-US" dirty="0" err="1"/>
+              <a:t>xunit</a:t>
+            </a:r>
+            <a:r>
+              <a:rPr lang="en-US" dirty="0"/>
+              <a:t> as well. </a:t>
+            </a:r>
+          </a:p>
+          <a:p>
+            <a:r>
+              <a:rPr lang="en-US" dirty="0"/>
+              <a:t>- Also, very importantly our very own team uses it. 1PACS, some </a:t>
+            </a:r>
+            <a:r>
+              <a:rPr lang="en-US" dirty="0" err="1"/>
+              <a:t>SignTools</a:t>
+            </a:r>
+            <a:r>
+              <a:rPr lang="en-US" dirty="0"/>
+              <a:t> and </a:t>
+            </a:r>
+            <a:r>
+              <a:rPr lang="en-US" dirty="0" err="1"/>
+              <a:t>NotationPlugin</a:t>
+            </a:r>
+            <a:r>
+              <a:rPr lang="en-US" dirty="0"/>
+              <a:t>.</a:t>
+            </a:r>
+          </a:p>
+        </p:txBody>
+      </p:sp>
+      <p:sp>
+        <p:nvSpPr>
+          <p:cNvPr id="4" name="Slide Number Placeholder 3"/>
+          <p:cNvSpPr>
+            <a:spLocks noGrp="1"/>
+          </p:cNvSpPr>
+          <p:nvPr>
+            <p:ph type="sldNum" sz="quarter" idx="5"/>
+          </p:nvPr>
+        </p:nvSpPr>
+        <p:spPr/>
+        <p:txBody>
+          <a:bodyPr/>
+          <a:lstStyle/>
+          <a:p>
+            <a:fld id="{22289C57-55D7-40A4-A101-E74FAC7A092B}" type="slidenum">
+              <a:rPr lang="en-US" smtClean="0"/>
+              <a:t>5</a:t>
+            </a:fld>
+            <a:endParaRPr lang="en-US" dirty="0"/>
+          </a:p>
+        </p:txBody>
+      </p:sp>
+    </p:spTree>
+    <p:extLst>
+      <p:ext uri="{BB962C8B-B14F-4D97-AF65-F5344CB8AC3E}">
+        <p14:creationId xmlns:p14="http://schemas.microsoft.com/office/powerpoint/2010/main" val="3448086791"/>
+      </p:ext>
+    </p:extLst>
+  </p:cSld>
+  <p:clrMapOvr>
+    <a:masterClrMapping/>
+  </p:clrMapOvr>
+</p:notes>
 </file>
 
 <file path=ppt/slideLayouts/slideLayout1.xml><?xml version="1.0" encoding="utf-8"?>
@@ -10075,7 +10604,7 @@
                 <a:effectLst/>
                 <a:latin typeface="-apple-system"/>
               </a:rPr>
-              <a:t>Unit testing helps to identify and fix bugs early in the development lifecycle, which can save time and money.</a:t>
+              <a:t>Unit testing helps to identify and fix bugs early in the development lifecycle.</a:t>
             </a:r>
           </a:p>
           <a:p>
@@ -10679,6 +11208,9 @@
               <a:rPr lang="en-US" dirty="0"/>
               <a:t>Dotnet</a:t>
             </a:r>
+          </a:p>
+          <a:p>
+            <a:endParaRPr lang="en-US" dirty="0"/>
           </a:p>
         </p:txBody>
       </p:sp>
@@ -12285,12 +12817,22 @@
 </file>
 
 <file path=customXml/item1.xml><?xml version="1.0" encoding="utf-8"?>
-<?mso-contentType ?>
-<FormTemplates xmlns="http://schemas.microsoft.com/sharepoint/v3/contenttype/forms">
-  <Display>DocumentLibraryForm</Display>
-  <Edit>DocumentLibraryForm</Edit>
-  <New>DocumentLibraryForm</New>
-</FormTemplates>
+<p:properties xmlns:p="http://schemas.microsoft.com/office/2006/metadata/properties" xmlns:xsi="http://www.w3.org/2001/XMLSchema-instance" xmlns:pc="http://schemas.microsoft.com/office/infopath/2007/PartnerControls">
+  <documentManagement>
+    <_ip_UnifiedCompliancePolicyUIAction xmlns="http://schemas.microsoft.com/sharepoint/v3" xsi:nil="true"/>
+    <Image xmlns="71af3243-3dd4-4a8d-8c0d-dd76da1f02a5">
+      <Url xsi:nil="true"/>
+      <Description xsi:nil="true"/>
+    </Image>
+    <Status xmlns="71af3243-3dd4-4a8d-8c0d-dd76da1f02a5">Not started</Status>
+    <_ip_UnifiedCompliancePolicyProperties xmlns="http://schemas.microsoft.com/sharepoint/v3" xsi:nil="true"/>
+    <ImageTagsTaxHTField xmlns="71af3243-3dd4-4a8d-8c0d-dd76da1f02a5">
+      <Terms xmlns="http://schemas.microsoft.com/office/infopath/2007/PartnerControls"/>
+    </ImageTagsTaxHTField>
+    <TaxCatchAll xmlns="230e9df3-be65-4c73-a93b-d1236ebd677e"/>
+    <MediaServiceKeyPoints xmlns="71af3243-3dd4-4a8d-8c0d-dd76da1f02a5" xsi:nil="true"/>
+  </documentManagement>
+</p:properties>
 </file>
 
 <file path=customXml/item2.xml><?xml version="1.0" encoding="utf-8"?>
@@ -12570,28 +13112,22 @@
 </file>
 
 <file path=customXml/item3.xml><?xml version="1.0" encoding="utf-8"?>
-<p:properties xmlns:p="http://schemas.microsoft.com/office/2006/metadata/properties" xmlns:xsi="http://www.w3.org/2001/XMLSchema-instance" xmlns:pc="http://schemas.microsoft.com/office/infopath/2007/PartnerControls">
-  <documentManagement>
-    <_ip_UnifiedCompliancePolicyUIAction xmlns="http://schemas.microsoft.com/sharepoint/v3" xsi:nil="true"/>
-    <Image xmlns="71af3243-3dd4-4a8d-8c0d-dd76da1f02a5">
-      <Url xsi:nil="true"/>
-      <Description xsi:nil="true"/>
-    </Image>
-    <Status xmlns="71af3243-3dd4-4a8d-8c0d-dd76da1f02a5">Not started</Status>
-    <_ip_UnifiedCompliancePolicyProperties xmlns="http://schemas.microsoft.com/sharepoint/v3" xsi:nil="true"/>
-    <ImageTagsTaxHTField xmlns="71af3243-3dd4-4a8d-8c0d-dd76da1f02a5">
-      <Terms xmlns="http://schemas.microsoft.com/office/infopath/2007/PartnerControls"/>
-    </ImageTagsTaxHTField>
-    <TaxCatchAll xmlns="230e9df3-be65-4c73-a93b-d1236ebd677e"/>
-    <MediaServiceKeyPoints xmlns="71af3243-3dd4-4a8d-8c0d-dd76da1f02a5" xsi:nil="true"/>
-  </documentManagement>
-</p:properties>
+<?mso-contentType ?>
+<FormTemplates xmlns="http://schemas.microsoft.com/sharepoint/v3/contenttype/forms">
+  <Display>DocumentLibraryForm</Display>
+  <Edit>DocumentLibraryForm</Edit>
+  <New>DocumentLibraryForm</New>
+</FormTemplates>
 </file>
 
 <file path=customXml/itemProps1.xml><?xml version="1.0" encoding="utf-8"?>
-<ds:datastoreItem xmlns:ds="http://schemas.openxmlformats.org/officeDocument/2006/customXml" ds:itemID="{0FD6FE22-81A0-4500-AFD0-342D21BB9A2C}">
+<ds:datastoreItem xmlns:ds="http://schemas.openxmlformats.org/officeDocument/2006/customXml" ds:itemID="{29C43685-694E-4579-B109-3C418D49DA65}">
   <ds:schemaRefs>
-    <ds:schemaRef ds:uri="http://schemas.microsoft.com/sharepoint/v3/contenttype/forms"/>
+    <ds:schemaRef ds:uri="http://schemas.microsoft.com/office/2006/metadata/properties"/>
+    <ds:schemaRef ds:uri="http://schemas.microsoft.com/office/infopath/2007/PartnerControls"/>
+    <ds:schemaRef ds:uri="http://schemas.microsoft.com/sharepoint/v3"/>
+    <ds:schemaRef ds:uri="71af3243-3dd4-4a8d-8c0d-dd76da1f02a5"/>
+    <ds:schemaRef ds:uri="230e9df3-be65-4c73-a93b-d1236ebd677e"/>
   </ds:schemaRefs>
 </ds:datastoreItem>
 </file>
@@ -12618,13 +13154,9 @@
 </file>
 
 <file path=customXml/itemProps3.xml><?xml version="1.0" encoding="utf-8"?>
-<ds:datastoreItem xmlns:ds="http://schemas.openxmlformats.org/officeDocument/2006/customXml" ds:itemID="{29C43685-694E-4579-B109-3C418D49DA65}">
+<ds:datastoreItem xmlns:ds="http://schemas.openxmlformats.org/officeDocument/2006/customXml" ds:itemID="{0FD6FE22-81A0-4500-AFD0-342D21BB9A2C}">
   <ds:schemaRefs>
-    <ds:schemaRef ds:uri="http://schemas.microsoft.com/office/2006/metadata/properties"/>
-    <ds:schemaRef ds:uri="http://schemas.microsoft.com/office/infopath/2007/PartnerControls"/>
-    <ds:schemaRef ds:uri="http://schemas.microsoft.com/sharepoint/v3"/>
-    <ds:schemaRef ds:uri="71af3243-3dd4-4a8d-8c0d-dd76da1f02a5"/>
-    <ds:schemaRef ds:uri="230e9df3-be65-4c73-a93b-d1236ebd677e"/>
+    <ds:schemaRef ds:uri="http://schemas.microsoft.com/sharepoint/v3/contenttype/forms"/>
   </ds:schemaRefs>
 </ds:datastoreItem>
 </file>

</xml_diff>

<commit_message>
Modify presentation to include more comments, fix text typos.
</commit_message>
<xml_diff>
--- a/Presentation/Unit Testing with Xunit - Moq.pptx
+++ b/Presentation/Unit Testing with Xunit - Moq.pptx
@@ -383,7 +383,7 @@
           <a:p>
             <a:fld id="{B56F32FC-4BD9-442A-A8C6-51598C909FE3}" type="datetimeFigureOut">
               <a:rPr lang="en-US" smtClean="0"/>
-              <a:t>8/7/2023</a:t>
+              <a:t>8/8/2023</a:t>
             </a:fld>
             <a:endParaRPr lang="en-US" dirty="0"/>
           </a:p>
@@ -560,7 +560,7 @@
           <a:p>
             <a:fld id="{056371FA-A98D-41E8-93F4-09945841298A}" type="datetimeFigureOut">
               <a:rPr lang="en-US" smtClean="0"/>
-              <a:t>8/7/2023</a:t>
+              <a:t>8/8/2023</a:t>
             </a:fld>
             <a:endParaRPr lang="en-US" dirty="0"/>
           </a:p>
@@ -1013,7 +1013,7 @@
                 <a:effectLst/>
                 <a:latin typeface="-apple-system"/>
               </a:rPr>
-              <a:t>- This of course applies just for the finite possibilities that we describe on our tests.</a:t>
+              <a:t>- This applies just for the finite possibilities that we describe on our tests; the good thing is we can always define more scenarios as discovered.</a:t>
             </a:r>
           </a:p>
           <a:p>
@@ -1042,7 +1042,7 @@
                 <a:effectLst/>
                 <a:latin typeface="-apple-system"/>
               </a:rPr>
-              <a:t>- Confidence gives us the ability to refactor while corroborating that functionalities are kept on the same levels as describes on our tests.</a:t>
+              <a:t>- And this Confidence gives us the ability to refactor while corroborating that functionalities are kept on the same levels as describes on our tests.</a:t>
             </a:r>
           </a:p>
           <a:p>
@@ -1071,7 +1071,7 @@
                 <a:effectLst/>
                 <a:latin typeface="-apple-system"/>
               </a:rPr>
-              <a:t>- Tests can describe usages of unis of code, it can also imply unforeseeable scenarios, which could happen when we find ways the source behave, and we find no documented tests showing considerations of this usages.</a:t>
+              <a:t>- And at the same time, undocumented tests can also imply unforeseeable behavior.</a:t>
             </a:r>
           </a:p>
           <a:p>
@@ -1129,7 +1129,7 @@
                 <a:effectLst/>
                 <a:latin typeface="-apple-system"/>
               </a:rPr>
-              <a:t>- As we iterate adding more scenarios and coverage on our tests, the trust on the code increases, this makes it easier to understand the impact of new features.</a:t>
+              <a:t>- As we iterate adding more scenarios and coverage on our tests, the trust on the code increases, and allows us to grasp the impact of new features.</a:t>
             </a:r>
           </a:p>
           <a:p>
@@ -1245,7 +1245,156 @@
           <a:p>
             <a:r>
               <a:rPr lang="en-US" dirty="0"/>
-              <a:t>- Aside from most of the core dotnet/</a:t>
+              <a:t>- It is currently part of the dotnet foundation. </a:t>
+            </a:r>
+          </a:p>
+          <a:p>
+            <a:r>
+              <a:rPr lang="en-US" dirty="0"/>
+              <a:t>- James was the creator of </a:t>
+            </a:r>
+            <a:r>
+              <a:rPr lang="en-US" dirty="0" err="1"/>
+              <a:t>nUnit</a:t>
+            </a:r>
+            <a:r>
+              <a:rPr lang="en-US" dirty="0"/>
+              <a:t> which is another popular dotnet testing library which continues development up to this day, which at the same time was inspired by the </a:t>
+            </a:r>
+            <a:r>
+              <a:rPr lang="en-US" dirty="0" err="1"/>
+              <a:t>jUnit</a:t>
+            </a:r>
+            <a:r>
+              <a:rPr lang="en-US" dirty="0"/>
+              <a:t> Java library. Brad is the core maintainer of the framework nowadays and he’s a retired ex-Microsoft Engineer.</a:t>
+            </a:r>
+          </a:p>
+          <a:p>
+            <a:r>
+              <a:rPr lang="en-US" dirty="0"/>
+              <a:t>-  This allows us the possibility of configuring the framework as we see fit.</a:t>
+            </a:r>
+          </a:p>
+          <a:p>
+            <a:r>
+              <a:rPr lang="en-US" dirty="0"/>
+              <a:t>- We will see some examples of these later and how these components can affect our tests design.</a:t>
+            </a:r>
+          </a:p>
+          <a:p>
+            <a:r>
+              <a:rPr lang="en-US" dirty="0"/>
+              <a:t>- We can provide configuration very specific for our environments not only for the design of our tests but also for the execution of these via the runners.</a:t>
+            </a:r>
+          </a:p>
+          <a:p>
+            <a:r>
+              <a:rPr lang="en-US" dirty="0"/>
+              <a:t>- </a:t>
+            </a:r>
+            <a:r>
+              <a:rPr lang="en-US" dirty="0" err="1"/>
+              <a:t>xUnit</a:t>
+            </a:r>
+            <a:r>
+              <a:rPr lang="en-US" dirty="0"/>
+              <a:t> API is minimal to start and although it requires us to understands certain conventions for actions, it follows a pattern that will be familiar to </a:t>
+            </a:r>
+            <a:r>
+              <a:rPr lang="en-US" dirty="0" err="1"/>
+              <a:t>.net</a:t>
+            </a:r>
+            <a:r>
+              <a:rPr lang="en-US" dirty="0"/>
+              <a:t> engineers.</a:t>
+            </a:r>
+          </a:p>
+        </p:txBody>
+      </p:sp>
+      <p:sp>
+        <p:nvSpPr>
+          <p:cNvPr id="4" name="Slide Number Placeholder 3"/>
+          <p:cNvSpPr>
+            <a:spLocks noGrp="1"/>
+          </p:cNvSpPr>
+          <p:nvPr>
+            <p:ph type="sldNum" sz="quarter" idx="5"/>
+          </p:nvPr>
+        </p:nvSpPr>
+        <p:spPr/>
+        <p:txBody>
+          <a:bodyPr/>
+          <a:lstStyle/>
+          <a:p>
+            <a:fld id="{22289C57-55D7-40A4-A101-E74FAC7A092B}" type="slidenum">
+              <a:rPr lang="en-US" smtClean="0"/>
+              <a:t>4</a:t>
+            </a:fld>
+            <a:endParaRPr lang="en-US" dirty="0"/>
+          </a:p>
+        </p:txBody>
+      </p:sp>
+    </p:spTree>
+    <p:extLst>
+      <p:ext uri="{BB962C8B-B14F-4D97-AF65-F5344CB8AC3E}">
+        <p14:creationId xmlns:p14="http://schemas.microsoft.com/office/powerpoint/2010/main" val="2447261612"/>
+      </p:ext>
+    </p:extLst>
+  </p:cSld>
+  <p:clrMapOvr>
+    <a:masterClrMapping/>
+  </p:clrMapOvr>
+</p:notes>
+</file>
+
+<file path=ppt/notesSlides/notesSlide4.xml><?xml version="1.0" encoding="utf-8"?>
+<p:notes xmlns:a="http://schemas.openxmlformats.org/drawingml/2006/main" xmlns:r="http://schemas.openxmlformats.org/officeDocument/2006/relationships" xmlns:p="http://schemas.openxmlformats.org/presentationml/2006/main">
+  <p:cSld>
+    <p:spTree>
+      <p:nvGrpSpPr>
+        <p:cNvPr id="1" name=""/>
+        <p:cNvGrpSpPr/>
+        <p:nvPr/>
+      </p:nvGrpSpPr>
+      <p:grpSpPr>
+        <a:xfrm>
+          <a:off x="0" y="0"/>
+          <a:ext cx="0" cy="0"/>
+          <a:chOff x="0" y="0"/>
+          <a:chExt cx="0" cy="0"/>
+        </a:xfrm>
+      </p:grpSpPr>
+      <p:sp>
+        <p:nvSpPr>
+          <p:cNvPr id="2" name="Slide Image Placeholder 1"/>
+          <p:cNvSpPr>
+            <a:spLocks noGrp="1" noRot="1" noChangeAspect="1"/>
+          </p:cNvSpPr>
+          <p:nvPr>
+            <p:ph type="sldImg"/>
+          </p:nvPr>
+        </p:nvSpPr>
+        <p:spPr/>
+      </p:sp>
+      <p:sp>
+        <p:nvSpPr>
+          <p:cNvPr id="3" name="Notes Placeholder 2"/>
+          <p:cNvSpPr>
+            <a:spLocks noGrp="1"/>
+          </p:cNvSpPr>
+          <p:nvPr>
+            <p:ph type="body" idx="1"/>
+          </p:nvPr>
+        </p:nvSpPr>
+        <p:spPr/>
+        <p:txBody>
+          <a:bodyPr/>
+          <a:lstStyle/>
+          <a:p>
+            <a:r>
+              <a:rPr lang="en-US" dirty="0"/>
+              <a:t>- Aside from the core dotnet/</a:t>
             </a:r>
             <a:r>
               <a:rPr lang="en-US" dirty="0" err="1"/>
@@ -1289,7 +1438,7 @@
             </a:r>
             <a:r>
               <a:rPr lang="en-US" dirty="0" err="1"/>
-              <a:t>xunit</a:t>
+              <a:t>xUnit</a:t>
             </a:r>
             <a:r>
               <a:rPr lang="en-US" dirty="0"/>
@@ -1299,7 +1448,7 @@
           <a:p>
             <a:r>
               <a:rPr lang="en-US" dirty="0"/>
-              <a:t>- Also, very importantly our very own team uses it. 1PACS, some </a:t>
+              <a:t>- Also, very importantly our very own team already uses it. Some examples of these include 1pACS, some </a:t>
             </a:r>
             <a:r>
               <a:rPr lang="en-US" dirty="0" err="1"/>
@@ -1347,6 +1496,159 @@
     <p:extLst>
       <p:ext uri="{BB962C8B-B14F-4D97-AF65-F5344CB8AC3E}">
         <p14:creationId xmlns:p14="http://schemas.microsoft.com/office/powerpoint/2010/main" val="3448086791"/>
+      </p:ext>
+    </p:extLst>
+  </p:cSld>
+  <p:clrMapOvr>
+    <a:masterClrMapping/>
+  </p:clrMapOvr>
+</p:notes>
+</file>
+
+<file path=ppt/notesSlides/notesSlide5.xml><?xml version="1.0" encoding="utf-8"?>
+<p:notes xmlns:a="http://schemas.openxmlformats.org/drawingml/2006/main" xmlns:r="http://schemas.openxmlformats.org/officeDocument/2006/relationships" xmlns:p="http://schemas.openxmlformats.org/presentationml/2006/main">
+  <p:cSld>
+    <p:spTree>
+      <p:nvGrpSpPr>
+        <p:cNvPr id="1" name=""/>
+        <p:cNvGrpSpPr/>
+        <p:nvPr/>
+      </p:nvGrpSpPr>
+      <p:grpSpPr>
+        <a:xfrm>
+          <a:off x="0" y="0"/>
+          <a:ext cx="0" cy="0"/>
+          <a:chOff x="0" y="0"/>
+          <a:chExt cx="0" cy="0"/>
+        </a:xfrm>
+      </p:grpSpPr>
+      <p:sp>
+        <p:nvSpPr>
+          <p:cNvPr id="2" name="Slide Image Placeholder 1"/>
+          <p:cNvSpPr>
+            <a:spLocks noGrp="1" noRot="1" noChangeAspect="1"/>
+          </p:cNvSpPr>
+          <p:nvPr>
+            <p:ph type="sldImg"/>
+          </p:nvPr>
+        </p:nvSpPr>
+        <p:spPr/>
+      </p:sp>
+      <p:sp>
+        <p:nvSpPr>
+          <p:cNvPr id="3" name="Notes Placeholder 2"/>
+          <p:cNvSpPr>
+            <a:spLocks noGrp="1"/>
+          </p:cNvSpPr>
+          <p:nvPr>
+            <p:ph type="body" idx="1"/>
+          </p:nvPr>
+        </p:nvSpPr>
+        <p:spPr/>
+        <p:txBody>
+          <a:bodyPr/>
+          <a:lstStyle/>
+          <a:p>
+            <a:r>
+              <a:rPr lang="en-US" dirty="0"/>
+              <a:t>- Although our team rarely starts here for our design process, we do have the ability to do so.</a:t>
+            </a:r>
+          </a:p>
+          <a:p>
+            <a:r>
+              <a:rPr lang="en-US" dirty="0"/>
+              <a:t>- With just 1 attribute we have working examples that can be run against the runners.</a:t>
+            </a:r>
+          </a:p>
+          <a:p>
+            <a:r>
+              <a:rPr lang="en-US" dirty="0"/>
+              <a:t>- Which means our test execution runs faster unlike sequential testing execution.</a:t>
+            </a:r>
+          </a:p>
+          <a:p>
+            <a:r>
+              <a:rPr lang="en-US" dirty="0"/>
+              <a:t>- We will see its customizable to allow otherwise and share context between each test.</a:t>
+            </a:r>
+          </a:p>
+          <a:p>
+            <a:r>
+              <a:rPr lang="en-US" dirty="0"/>
+              <a:t>- These are important to understand on the context of which type of tests we are designing.</a:t>
+            </a:r>
+          </a:p>
+          <a:p>
+            <a:r>
+              <a:rPr lang="en-US" dirty="0"/>
+              <a:t>- It will help our engineers follow similar patterns on our codebases and it can also allow us to enforce certain structures as anti-patterns and make the dotnet compiler throw errors for not following the suggested patterns.</a:t>
+            </a:r>
+          </a:p>
+          <a:p>
+            <a:r>
+              <a:rPr lang="en-US" dirty="0"/>
+              <a:t>- This means we can run on </a:t>
+            </a:r>
+            <a:r>
+              <a:rPr lang="en-US" dirty="0" err="1"/>
+              <a:t>linux</a:t>
+            </a:r>
+            <a:r>
+              <a:rPr lang="en-US" dirty="0"/>
+              <a:t> or </a:t>
+            </a:r>
+            <a:r>
+              <a:rPr lang="en-US" dirty="0" err="1"/>
+              <a:t>macos</a:t>
+            </a:r>
+            <a:r>
+              <a:rPr lang="en-US" dirty="0"/>
+              <a:t> as well.</a:t>
+            </a:r>
+          </a:p>
+          <a:p>
+            <a:r>
+              <a:rPr lang="en-US" dirty="0"/>
+              <a:t>- </a:t>
+            </a:r>
+            <a:r>
+              <a:rPr lang="en-US" dirty="0" err="1"/>
+              <a:t>xUnit</a:t>
+            </a:r>
+            <a:r>
+              <a:rPr lang="en-US" dirty="0"/>
+              <a:t> provides abstractions to create our customer runners.</a:t>
+            </a:r>
+          </a:p>
+        </p:txBody>
+      </p:sp>
+      <p:sp>
+        <p:nvSpPr>
+          <p:cNvPr id="4" name="Slide Number Placeholder 3"/>
+          <p:cNvSpPr>
+            <a:spLocks noGrp="1"/>
+          </p:cNvSpPr>
+          <p:nvPr>
+            <p:ph type="sldNum" sz="quarter" idx="5"/>
+          </p:nvPr>
+        </p:nvSpPr>
+        <p:spPr/>
+        <p:txBody>
+          <a:bodyPr/>
+          <a:lstStyle/>
+          <a:p>
+            <a:fld id="{22289C57-55D7-40A4-A101-E74FAC7A092B}" type="slidenum">
+              <a:rPr lang="en-US" smtClean="0"/>
+              <a:t>6</a:t>
+            </a:fld>
+            <a:endParaRPr lang="en-US" dirty="0"/>
+          </a:p>
+        </p:txBody>
+      </p:sp>
+    </p:spTree>
+    <p:extLst>
+      <p:ext uri="{BB962C8B-B14F-4D97-AF65-F5344CB8AC3E}">
+        <p14:creationId xmlns:p14="http://schemas.microsoft.com/office/powerpoint/2010/main" val="2848143561"/>
       </p:ext>
     </p:extLst>
   </p:cSld>
@@ -11166,12 +11468,18 @@
               <a:buChar char="•"/>
             </a:pPr>
             <a:r>
-              <a:rPr lang="en-US" dirty="0" err="1"/>
-              <a:t>Asp.Net</a:t>
-            </a:r>
-            <a:r>
               <a:rPr lang="en-US" dirty="0"/>
-              <a:t> Core</a:t>
+              <a:t>Dotnet (</a:t>
+            </a:r>
+            <a:r>
+              <a:rPr lang="en-US" dirty="0">
+                <a:hlinkClick r:id="rId3"/>
+              </a:rPr>
+              <a:t>https://github.com/dotnet</a:t>
+            </a:r>
+            <a:r>
+              <a:rPr lang="en-US" dirty="0"/>
+              <a:t>)</a:t>
             </a:r>
           </a:p>
           <a:p>
@@ -11181,9 +11489,22 @@
             </a:pPr>
             <a:r>
               <a:rPr lang="en-US" dirty="0" err="1"/>
-              <a:t>SignalR</a:t>
-            </a:r>
-            <a:endParaRPr lang="en-US" dirty="0"/>
+              <a:t>Asp.Net</a:t>
+            </a:r>
+            <a:r>
+              <a:rPr lang="en-US" dirty="0"/>
+              <a:t> Core (</a:t>
+            </a:r>
+            <a:r>
+              <a:rPr lang="en-US" dirty="0">
+                <a:hlinkClick r:id="rId4"/>
+              </a:rPr>
+              <a:t>https://github.com/dotnet/aspnetcore</a:t>
+            </a:r>
+            <a:r>
+              <a:rPr lang="en-US" dirty="0"/>
+              <a:t>)</a:t>
+            </a:r>
           </a:p>
           <a:p>
             <a:pPr marL="285750" indent="-285750">
@@ -11192,11 +11513,21 @@
             </a:pPr>
             <a:r>
               <a:rPr lang="en-US" dirty="0" err="1"/>
-              <a:t>Powershell</a:t>
+              <a:t>SignalR</a:t>
             </a:r>
             <a:r>
               <a:rPr lang="en-US" dirty="0"/>
-              <a:t> Core</a:t>
+              <a:t> (</a:t>
+            </a:r>
+            <a:r>
+              <a:rPr lang="en-US" dirty="0">
+                <a:hlinkClick r:id="rId5"/>
+              </a:rPr>
+              <a:t>https://github.com/SignalR</a:t>
+            </a:r>
+            <a:r>
+              <a:rPr lang="en-US" dirty="0"/>
+              <a:t>)</a:t>
             </a:r>
           </a:p>
           <a:p>
@@ -11205,8 +11536,22 @@
               <a:buChar char="•"/>
             </a:pPr>
             <a:r>
+              <a:rPr lang="en-US" dirty="0" err="1"/>
+              <a:t>Powershell</a:t>
+            </a:r>
+            <a:r>
               <a:rPr lang="en-US" dirty="0"/>
-              <a:t>Dotnet</a:t>
+              <a:t> Core (</a:t>
+            </a:r>
+            <a:r>
+              <a:rPr lang="en-US" dirty="0">
+                <a:hlinkClick r:id="rId6"/>
+              </a:rPr>
+              <a:t>https://github.com/PowerShell</a:t>
+            </a:r>
+            <a:r>
+              <a:rPr lang="en-US" dirty="0"/>
+              <a:t>)</a:t>
             </a:r>
           </a:p>
           <a:p>
@@ -11445,7 +11790,7 @@
             </a:pPr>
             <a:r>
               <a:rPr lang="en-US" dirty="0"/>
-              <a:t>Allows us the flexibility  to incorporate complexity using class fixtures and collection fixtures</a:t>
+              <a:t>Allows us the flexibility to incorporate complex patterns using class fixtures and collection fixtures</a:t>
             </a:r>
           </a:p>
           <a:p>

</xml_diff>

<commit_message>
Adding more MOQ slides for Who use and Why MOQ.
</commit_message>
<xml_diff>
--- a/Presentation/Unit Testing with Xunit - Moq.pptx
+++ b/Presentation/Unit Testing with Xunit - Moq.pptx
@@ -5,10 +5,10 @@
     <p:sldMasterId id="2147483648" r:id="rId4"/>
   </p:sldMasterIdLst>
   <p:notesMasterIdLst>
-    <p:notesMasterId r:id="rId13"/>
+    <p:notesMasterId r:id="rId15"/>
   </p:notesMasterIdLst>
   <p:handoutMasterIdLst>
-    <p:handoutMasterId r:id="rId14"/>
+    <p:handoutMasterId r:id="rId16"/>
   </p:handoutMasterIdLst>
   <p:sldIdLst>
     <p:sldId id="256" r:id="rId5"/>
@@ -18,7 +18,9 @@
     <p:sldId id="274" r:id="rId9"/>
     <p:sldId id="275" r:id="rId10"/>
     <p:sldId id="277" r:id="rId11"/>
-    <p:sldId id="276" r:id="rId12"/>
+    <p:sldId id="278" r:id="rId12"/>
+    <p:sldId id="279" r:id="rId13"/>
+    <p:sldId id="276" r:id="rId14"/>
   </p:sldIdLst>
   <p:sldSz cx="12192000" cy="6858000"/>
   <p:notesSz cx="6858000" cy="9144000"/>
@@ -383,7 +385,7 @@
           <a:p>
             <a:fld id="{B56F32FC-4BD9-442A-A8C6-51598C909FE3}" type="datetimeFigureOut">
               <a:rPr lang="en-US" smtClean="0"/>
-              <a:t>8/8/2023</a:t>
+              <a:t>8/9/2023</a:t>
             </a:fld>
             <a:endParaRPr lang="en-US" dirty="0"/>
           </a:p>
@@ -560,7 +562,7 @@
           <a:p>
             <a:fld id="{056371FA-A98D-41E8-93F4-09945841298A}" type="datetimeFigureOut">
               <a:rPr lang="en-US" smtClean="0"/>
-              <a:t>8/8/2023</a:t>
+              <a:t>8/9/2023</a:t>
             </a:fld>
             <a:endParaRPr lang="en-US" dirty="0"/>
           </a:p>
@@ -10579,6 +10581,167 @@
 </p:sld>
 </file>
 
+<file path=ppt/slides/slide10.xml><?xml version="1.0" encoding="utf-8"?>
+<p:sld xmlns:a="http://schemas.openxmlformats.org/drawingml/2006/main" xmlns:r="http://schemas.openxmlformats.org/officeDocument/2006/relationships" xmlns:p="http://schemas.openxmlformats.org/presentationml/2006/main">
+  <p:cSld>
+    <p:spTree>
+      <p:nvGrpSpPr>
+        <p:cNvPr id="1" name=""/>
+        <p:cNvGrpSpPr/>
+        <p:nvPr/>
+      </p:nvGrpSpPr>
+      <p:grpSpPr>
+        <a:xfrm>
+          <a:off x="0" y="0"/>
+          <a:ext cx="0" cy="0"/>
+          <a:chOff x="0" y="0"/>
+          <a:chExt cx="0" cy="0"/>
+        </a:xfrm>
+      </p:grpSpPr>
+      <p:sp>
+        <p:nvSpPr>
+          <p:cNvPr id="7" name="Title 6">
+            <a:extLst>
+              <a:ext uri="{FF2B5EF4-FFF2-40B4-BE49-F238E27FC236}">
+                <a16:creationId xmlns:a16="http://schemas.microsoft.com/office/drawing/2014/main" id="{22146FF1-8758-577F-A57A-9F1219849CBA}"/>
+              </a:ext>
+            </a:extLst>
+          </p:cNvPr>
+          <p:cNvSpPr>
+            <a:spLocks noGrp="1"/>
+          </p:cNvSpPr>
+          <p:nvPr>
+            <p:ph type="title"/>
+          </p:nvPr>
+        </p:nvSpPr>
+        <p:spPr>
+          <a:xfrm>
+            <a:off x="6909485" y="690691"/>
+            <a:ext cx="3596590" cy="1909763"/>
+          </a:xfrm>
+        </p:spPr>
+        <p:txBody>
+          <a:bodyPr>
+            <a:normAutofit/>
+          </a:bodyPr>
+          <a:lstStyle/>
+          <a:p>
+            <a:r>
+              <a:rPr lang="en-US" sz="3600" dirty="0"/>
+              <a:t>DEMOS</a:t>
+            </a:r>
+          </a:p>
+        </p:txBody>
+      </p:sp>
+      <p:sp>
+        <p:nvSpPr>
+          <p:cNvPr id="4" name="Date Placeholder 3">
+            <a:extLst>
+              <a:ext uri="{FF2B5EF4-FFF2-40B4-BE49-F238E27FC236}">
+                <a16:creationId xmlns:a16="http://schemas.microsoft.com/office/drawing/2014/main" id="{98DED095-5FE1-470E-1ABF-9B2A767B5C4F}"/>
+              </a:ext>
+            </a:extLst>
+          </p:cNvPr>
+          <p:cNvSpPr>
+            <a:spLocks noGrp="1"/>
+          </p:cNvSpPr>
+          <p:nvPr>
+            <p:ph type="dt" sz="half" idx="10"/>
+          </p:nvPr>
+        </p:nvSpPr>
+        <p:spPr>
+          <a:xfrm>
+            <a:off x="975631" y="6356349"/>
+            <a:ext cx="1695450" cy="365125"/>
+          </a:xfrm>
+        </p:spPr>
+        <p:txBody>
+          <a:bodyPr/>
+          <a:lstStyle/>
+          <a:p>
+            <a:r>
+              <a:rPr lang="en-US" dirty="0"/>
+              <a:t>2023</a:t>
+            </a:r>
+          </a:p>
+        </p:txBody>
+      </p:sp>
+      <p:sp>
+        <p:nvSpPr>
+          <p:cNvPr id="5" name="Footer Placeholder 4">
+            <a:extLst>
+              <a:ext uri="{FF2B5EF4-FFF2-40B4-BE49-F238E27FC236}">
+                <a16:creationId xmlns:a16="http://schemas.microsoft.com/office/drawing/2014/main" id="{0BA995A7-77A9-23AF-0167-3F94186DA1C6}"/>
+              </a:ext>
+            </a:extLst>
+          </p:cNvPr>
+          <p:cNvSpPr>
+            <a:spLocks noGrp="1"/>
+          </p:cNvSpPr>
+          <p:nvPr>
+            <p:ph type="ftr" sz="quarter" idx="11"/>
+          </p:nvPr>
+        </p:nvSpPr>
+        <p:spPr>
+          <a:xfrm>
+            <a:off x="4824412" y="6356348"/>
+            <a:ext cx="2543175" cy="365125"/>
+          </a:xfrm>
+        </p:spPr>
+        <p:txBody>
+          <a:bodyPr/>
+          <a:lstStyle/>
+          <a:p>
+            <a:r>
+              <a:rPr lang="en-US" dirty="0"/>
+              <a:t>Unit Testing with Xunit.net &amp; MOQ</a:t>
+            </a:r>
+          </a:p>
+        </p:txBody>
+      </p:sp>
+      <p:sp>
+        <p:nvSpPr>
+          <p:cNvPr id="6" name="Slide Number Placeholder 5">
+            <a:extLst>
+              <a:ext uri="{FF2B5EF4-FFF2-40B4-BE49-F238E27FC236}">
+                <a16:creationId xmlns:a16="http://schemas.microsoft.com/office/drawing/2014/main" id="{E0B7FA38-FFCF-95C3-8C11-C57798C0B720}"/>
+              </a:ext>
+            </a:extLst>
+          </p:cNvPr>
+          <p:cNvSpPr>
+            <a:spLocks noGrp="1"/>
+          </p:cNvSpPr>
+          <p:nvPr>
+            <p:ph type="sldNum" sz="quarter" idx="12"/>
+          </p:nvPr>
+        </p:nvSpPr>
+        <p:spPr/>
+        <p:txBody>
+          <a:bodyPr/>
+          <a:lstStyle/>
+          <a:p>
+            <a:fld id="{A49DFD55-3C28-40EF-9E31-A92D2E4017FF}" type="slidenum">
+              <a:rPr lang="en-US" smtClean="0"/>
+              <a:pPr/>
+              <a:t>10</a:t>
+            </a:fld>
+            <a:endParaRPr lang="en-US" dirty="0"/>
+          </a:p>
+        </p:txBody>
+      </p:sp>
+    </p:spTree>
+    <p:extLst>
+      <p:ext uri="{BB962C8B-B14F-4D97-AF65-F5344CB8AC3E}">
+        <p14:creationId xmlns:p14="http://schemas.microsoft.com/office/powerpoint/2010/main" val="3537118657"/>
+      </p:ext>
+    </p:extLst>
+  </p:cSld>
+  <p:clrMapOvr>
+    <a:masterClrMapping/>
+  </p:clrMapOvr>
+</p:sld>
+</file>
+
 <file path=ppt/slides/slide2.xml><?xml version="1.0" encoding="utf-8"?>
 <p:sld xmlns:a="http://schemas.openxmlformats.org/drawingml/2006/main" xmlns:r="http://schemas.openxmlformats.org/officeDocument/2006/relationships" xmlns:p="http://schemas.openxmlformats.org/presentationml/2006/main">
   <p:cSld>
@@ -10691,7 +10854,29 @@
           <a:p>
             <a:r>
               <a:rPr lang="en-US" dirty="0"/>
-              <a:t>What's Moq?</a:t>
+              <a:t>What's </a:t>
+            </a:r>
+            <a:r>
+              <a:rPr lang="en-US" dirty="0" err="1"/>
+              <a:t>Moq</a:t>
+            </a:r>
+            <a:r>
+              <a:rPr lang="en-US" dirty="0"/>
+              <a:t>?</a:t>
+            </a:r>
+          </a:p>
+          <a:p>
+            <a:r>
+              <a:rPr lang="en-US" dirty="0"/>
+              <a:t>Why </a:t>
+            </a:r>
+            <a:r>
+              <a:rPr lang="en-US" dirty="0" err="1"/>
+              <a:t>Moq</a:t>
+            </a:r>
+            <a:r>
+              <a:rPr lang="en-US" dirty="0"/>
+              <a:t>?</a:t>
             </a:r>
           </a:p>
           <a:p>
@@ -10763,7 +10948,7 @@
           <a:p>
             <a:r>
               <a:rPr lang="en-US" dirty="0"/>
-              <a:t>Unit testing  with Xunit.net &amp; Moq</a:t>
+              <a:t>Unit testing  with Xunit.net &amp; MOQ</a:t>
             </a:r>
           </a:p>
         </p:txBody>
@@ -11036,7 +11221,7 @@
           <a:p>
             <a:r>
               <a:rPr lang="en-US" dirty="0"/>
-              <a:t>Unit testing  with Xunit.net &amp; Moq</a:t>
+              <a:t>Unit testing  with Xunit.net &amp; MOQ</a:t>
             </a:r>
           </a:p>
         </p:txBody>
@@ -11315,7 +11500,7 @@
           <a:p>
             <a:r>
               <a:rPr lang="en-US" dirty="0"/>
-              <a:t>Unit testing  with Xunit.net &amp; Moq</a:t>
+              <a:t>Unit testing  with Xunit.net &amp; MOQ</a:t>
             </a:r>
           </a:p>
         </p:txBody>
@@ -11610,7 +11795,7 @@
           <a:p>
             <a:r>
               <a:rPr lang="en-US" dirty="0"/>
-              <a:t>Unit testing  with Xunit.net &amp; Moq</a:t>
+              <a:t>Unit testing  with Xunit.net &amp; MOQ</a:t>
             </a:r>
           </a:p>
         </p:txBody>
@@ -11891,7 +12076,7 @@
           <a:p>
             <a:r>
               <a:rPr lang="en-US" dirty="0"/>
-              <a:t>Unit testing  with Xunit.net &amp; Moq</a:t>
+              <a:t>Unit testing  with Xunit.net &amp; MOQ</a:t>
             </a:r>
           </a:p>
         </p:txBody>
@@ -12008,7 +12193,7 @@
         <p:spPr>
           <a:xfrm>
             <a:off x="5476875" y="2230395"/>
-            <a:ext cx="5111750" cy="3478427"/>
+            <a:ext cx="5783308" cy="3478427"/>
           </a:xfrm>
         </p:spPr>
         <p:txBody>
@@ -12023,7 +12208,7 @@
             </a:pPr>
             <a:r>
               <a:rPr lang="en-US" dirty="0"/>
-              <a:t>Simplified Syntax</a:t>
+              <a:t>MOQ is a .NET mocking framework that aids in unit testing by creating mock objects.</a:t>
             </a:r>
           </a:p>
           <a:p>
@@ -12033,7 +12218,7 @@
             </a:pPr>
             <a:r>
               <a:rPr lang="en-US" dirty="0"/>
-              <a:t>Lambda Expressions</a:t>
+              <a:t>It allows you to simulate the behavior of dependencies, enabling isolated testing.</a:t>
             </a:r>
           </a:p>
           <a:p>
@@ -12043,77 +12228,7 @@
             </a:pPr>
             <a:r>
               <a:rPr lang="en-US" dirty="0"/>
-              <a:t>No Interface Requirements</a:t>
-            </a:r>
-          </a:p>
-          <a:p>
-            <a:pPr marL="285750" indent="-285750">
-              <a:buFont typeface="Arial" panose="020B0604020202020204" pitchFamily="34" charset="0"/>
-              <a:buChar char="•"/>
-            </a:pPr>
-            <a:r>
-              <a:rPr lang="en-US" dirty="0"/>
-              <a:t>Strict Mocking by Default</a:t>
-            </a:r>
-          </a:p>
-          <a:p>
-            <a:pPr marL="285750" indent="-285750">
-              <a:buFont typeface="Arial" panose="020B0604020202020204" pitchFamily="34" charset="0"/>
-              <a:buChar char="•"/>
-            </a:pPr>
-            <a:r>
-              <a:rPr lang="en-US" dirty="0"/>
-              <a:t>Partial Mocking</a:t>
-            </a:r>
-          </a:p>
-          <a:p>
-            <a:pPr marL="285750" indent="-285750">
-              <a:buFont typeface="Arial" panose="020B0604020202020204" pitchFamily="34" charset="0"/>
-              <a:buChar char="•"/>
-            </a:pPr>
-            <a:r>
-              <a:rPr lang="en-US" dirty="0"/>
-              <a:t>Seamless Integration</a:t>
-            </a:r>
-          </a:p>
-          <a:p>
-            <a:pPr marL="285750" indent="-285750">
-              <a:buFont typeface="Arial" panose="020B0604020202020204" pitchFamily="34" charset="0"/>
-              <a:buChar char="•"/>
-            </a:pPr>
-            <a:r>
-              <a:rPr lang="en-US" dirty="0"/>
-              <a:t>Verification of Calls</a:t>
-            </a:r>
-          </a:p>
-          <a:p>
-            <a:pPr marL="285750" indent="-285750">
-              <a:buFont typeface="Arial" panose="020B0604020202020204" pitchFamily="34" charset="0"/>
-              <a:buChar char="•"/>
-            </a:pPr>
-            <a:r>
-              <a:rPr lang="en-US" dirty="0"/>
-              <a:t>No Need for Record and Replay</a:t>
-            </a:r>
-          </a:p>
-          <a:p>
-            <a:pPr marL="285750" indent="-285750">
-              <a:buFont typeface="Arial" panose="020B0604020202020204" pitchFamily="34" charset="0"/>
-              <a:buChar char="•"/>
-            </a:pPr>
-            <a:r>
-              <a:rPr lang="en-US" dirty="0"/>
-              <a:t>Strong Community Support</a:t>
-            </a:r>
-          </a:p>
-          <a:p>
-            <a:pPr marL="285750" indent="-285750">
-              <a:buFont typeface="Arial" panose="020B0604020202020204" pitchFamily="34" charset="0"/>
-              <a:buChar char="•"/>
-            </a:pPr>
-            <a:r>
-              <a:rPr lang="en-US" dirty="0"/>
-              <a:t>Readability and Maintainability</a:t>
+              <a:t>It was created by Daniel Cazzulino.</a:t>
             </a:r>
           </a:p>
         </p:txBody>
@@ -12169,7 +12284,7 @@
           <a:p>
             <a:r>
               <a:rPr lang="en-US" dirty="0"/>
-              <a:t>Unit testing  with Xunit.net &amp; Moq</a:t>
+              <a:t>Unit testing  with Xunit.net &amp; MOQ</a:t>
             </a:r>
           </a:p>
         </p:txBody>
@@ -12236,10 +12351,10 @@
       </p:grpSpPr>
       <p:sp>
         <p:nvSpPr>
-          <p:cNvPr id="7" name="Title 6">
-            <a:extLst>
-              <a:ext uri="{FF2B5EF4-FFF2-40B4-BE49-F238E27FC236}">
-                <a16:creationId xmlns:a16="http://schemas.microsoft.com/office/drawing/2014/main" id="{22146FF1-8758-577F-A57A-9F1219849CBA}"/>
+          <p:cNvPr id="2" name="Title 1">
+            <a:extLst>
+              <a:ext uri="{FF2B5EF4-FFF2-40B4-BE49-F238E27FC236}">
+                <a16:creationId xmlns:a16="http://schemas.microsoft.com/office/drawing/2014/main" id="{421C3591-CFE4-19C3-3800-C740B7949603}"/>
               </a:ext>
             </a:extLst>
           </p:cNvPr>
@@ -12252,8 +12367,41 @@
         </p:nvSpPr>
         <p:spPr>
           <a:xfrm>
-            <a:off x="6909485" y="690691"/>
-            <a:ext cx="3596590" cy="1909763"/>
+            <a:off x="5476875" y="1303637"/>
+            <a:ext cx="5111750" cy="553481"/>
+          </a:xfrm>
+        </p:spPr>
+        <p:txBody>
+          <a:bodyPr/>
+          <a:lstStyle/>
+          <a:p>
+            <a:r>
+              <a:rPr lang="en-US" dirty="0"/>
+              <a:t>Who USES Moq?</a:t>
+            </a:r>
+          </a:p>
+        </p:txBody>
+      </p:sp>
+      <p:sp>
+        <p:nvSpPr>
+          <p:cNvPr id="3" name="Text Placeholder 2">
+            <a:extLst>
+              <a:ext uri="{FF2B5EF4-FFF2-40B4-BE49-F238E27FC236}">
+                <a16:creationId xmlns:a16="http://schemas.microsoft.com/office/drawing/2014/main" id="{CAD990F4-927A-7B4D-64DB-BEC37B461656}"/>
+              </a:ext>
+            </a:extLst>
+          </p:cNvPr>
+          <p:cNvSpPr>
+            <a:spLocks noGrp="1"/>
+          </p:cNvSpPr>
+          <p:nvPr>
+            <p:ph type="body" idx="1"/>
+          </p:nvPr>
+        </p:nvSpPr>
+        <p:spPr>
+          <a:xfrm>
+            <a:off x="5476874" y="2230395"/>
+            <a:ext cx="5739765" cy="3478427"/>
           </a:xfrm>
         </p:spPr>
         <p:txBody>
@@ -12262,10 +12410,107 @@
           </a:bodyPr>
           <a:lstStyle/>
           <a:p>
-            <a:r>
-              <a:rPr lang="en-US" sz="3600" dirty="0"/>
-              <a:t>DEMOS</a:t>
-            </a:r>
+            <a:pPr marL="285750" indent="-285750">
+              <a:buFont typeface="Arial" panose="020B0604020202020204" pitchFamily="34" charset="0"/>
+              <a:buChar char="•"/>
+            </a:pPr>
+            <a:r>
+              <a:rPr lang="en-US" dirty="0"/>
+              <a:t>Microsoft/</a:t>
+            </a:r>
+            <a:r>
+              <a:rPr lang="en-US" dirty="0" err="1"/>
+              <a:t>PowerToys</a:t>
+            </a:r>
+            <a:r>
+              <a:rPr lang="en-US" dirty="0"/>
+              <a:t> (</a:t>
+            </a:r>
+            <a:r>
+              <a:rPr lang="en-US" dirty="0">
+                <a:hlinkClick r:id="rId2"/>
+              </a:rPr>
+              <a:t>https://github.com/microsoft/PowerToys</a:t>
+            </a:r>
+            <a:r>
+              <a:rPr lang="en-US" dirty="0"/>
+              <a:t>)</a:t>
+            </a:r>
+          </a:p>
+          <a:p>
+            <a:pPr marL="285750" indent="-285750">
+              <a:buFont typeface="Arial" panose="020B0604020202020204" pitchFamily="34" charset="0"/>
+              <a:buChar char="•"/>
+            </a:pPr>
+            <a:r>
+              <a:rPr lang="en-US" dirty="0" err="1"/>
+              <a:t>Wox</a:t>
+            </a:r>
+            <a:r>
+              <a:rPr lang="en-US" dirty="0"/>
+              <a:t> (</a:t>
+            </a:r>
+            <a:r>
+              <a:rPr lang="en-US" dirty="0">
+                <a:hlinkClick r:id="rId3"/>
+              </a:rPr>
+              <a:t>https://github.com/Wox-launcher/Wox</a:t>
+            </a:r>
+            <a:r>
+              <a:rPr lang="en-US" dirty="0"/>
+              <a:t>)</a:t>
+            </a:r>
+          </a:p>
+          <a:p>
+            <a:pPr marL="285750" indent="-285750">
+              <a:buFont typeface="Arial" panose="020B0604020202020204" pitchFamily="34" charset="0"/>
+              <a:buChar char="•"/>
+            </a:pPr>
+            <a:r>
+              <a:rPr lang="en-US" dirty="0"/>
+              <a:t>Avalonia (</a:t>
+            </a:r>
+            <a:r>
+              <a:rPr lang="en-US" dirty="0">
+                <a:hlinkClick r:id="rId4"/>
+              </a:rPr>
+              <a:t>https://github.com/AvaloniaUI/Avalonia</a:t>
+            </a:r>
+            <a:r>
+              <a:rPr lang="en-US" dirty="0"/>
+              <a:t>)</a:t>
+            </a:r>
+          </a:p>
+          <a:p>
+            <a:pPr marL="285750" indent="-285750">
+              <a:buFont typeface="Arial" panose="020B0604020202020204" pitchFamily="34" charset="0"/>
+              <a:buChar char="•"/>
+            </a:pPr>
+            <a:r>
+              <a:rPr lang="en-US" dirty="0" err="1"/>
+              <a:t>Jellyfin</a:t>
+            </a:r>
+            <a:r>
+              <a:rPr lang="en-US" dirty="0"/>
+              <a:t> (</a:t>
+            </a:r>
+            <a:r>
+              <a:rPr lang="en-US" dirty="0">
+                <a:hlinkClick r:id="rId5"/>
+              </a:rPr>
+              <a:t>https://github.com/jellyfin/jellyfin</a:t>
+            </a:r>
+            <a:r>
+              <a:rPr lang="en-US" dirty="0"/>
+              <a:t>)</a:t>
+            </a:r>
+          </a:p>
+          <a:p>
+            <a:pPr marL="285750" indent="-285750">
+              <a:buFont typeface="Arial" panose="020B0604020202020204" pitchFamily="34" charset="0"/>
+              <a:buChar char="•"/>
+            </a:pPr>
+            <a:endParaRPr lang="en-US" dirty="0"/>
           </a:p>
         </p:txBody>
       </p:sp>
@@ -12274,7 +12519,7 @@
           <p:cNvPr id="4" name="Date Placeholder 3">
             <a:extLst>
               <a:ext uri="{FF2B5EF4-FFF2-40B4-BE49-F238E27FC236}">
-                <a16:creationId xmlns:a16="http://schemas.microsoft.com/office/drawing/2014/main" id="{98DED095-5FE1-470E-1ABF-9B2A767B5C4F}"/>
+                <a16:creationId xmlns:a16="http://schemas.microsoft.com/office/drawing/2014/main" id="{205F9160-F798-4B99-7E36-7629FD7568C3}"/>
               </a:ext>
             </a:extLst>
           </p:cNvPr>
@@ -12291,10 +12536,9 @@
           <a:lstStyle/>
           <a:p>
             <a:r>
-              <a:rPr lang="en-US"/>
-              <a:t>20XX</a:t>
-            </a:r>
-            <a:endParaRPr lang="en-US" dirty="0"/>
+              <a:rPr lang="en-US" dirty="0"/>
+              <a:t>2023</a:t>
+            </a:r>
           </a:p>
         </p:txBody>
       </p:sp>
@@ -12303,7 +12547,7 @@
           <p:cNvPr id="5" name="Footer Placeholder 4">
             <a:extLst>
               <a:ext uri="{FF2B5EF4-FFF2-40B4-BE49-F238E27FC236}">
-                <a16:creationId xmlns:a16="http://schemas.microsoft.com/office/drawing/2014/main" id="{0BA995A7-77A9-23AF-0167-3F94186DA1C6}"/>
+                <a16:creationId xmlns:a16="http://schemas.microsoft.com/office/drawing/2014/main" id="{5AFD9DB7-BE03-6FA0-E368-3AE30AE13F18}"/>
               </a:ext>
             </a:extLst>
           </p:cNvPr>
@@ -12320,10 +12564,9 @@
           <a:lstStyle/>
           <a:p>
             <a:r>
-              <a:rPr lang="en-US"/>
-              <a:t>PRESENTATION TITLE</a:t>
-            </a:r>
-            <a:endParaRPr lang="en-US" dirty="0"/>
+              <a:rPr lang="en-US" dirty="0"/>
+              <a:t>Unit testing  with Xunit.net &amp; MOQ</a:t>
+            </a:r>
           </a:p>
         </p:txBody>
       </p:sp>
@@ -12332,7 +12575,7 @@
           <p:cNvPr id="6" name="Slide Number Placeholder 5">
             <a:extLst>
               <a:ext uri="{FF2B5EF4-FFF2-40B4-BE49-F238E27FC236}">
-                <a16:creationId xmlns:a16="http://schemas.microsoft.com/office/drawing/2014/main" id="{E0B7FA38-FFCF-95C3-8C11-C57798C0B720}"/>
+                <a16:creationId xmlns:a16="http://schemas.microsoft.com/office/drawing/2014/main" id="{1593F57E-B6AE-B9E5-EB77-283BA94280E1}"/>
               </a:ext>
             </a:extLst>
           </p:cNvPr>
@@ -12360,7 +12603,300 @@
     </p:spTree>
     <p:extLst>
       <p:ext uri="{BB962C8B-B14F-4D97-AF65-F5344CB8AC3E}">
-        <p14:creationId xmlns:p14="http://schemas.microsoft.com/office/powerpoint/2010/main" val="3537118657"/>
+        <p14:creationId xmlns:p14="http://schemas.microsoft.com/office/powerpoint/2010/main" val="2601820820"/>
+      </p:ext>
+    </p:extLst>
+  </p:cSld>
+  <p:clrMapOvr>
+    <a:masterClrMapping/>
+  </p:clrMapOvr>
+</p:sld>
+</file>
+
+<file path=ppt/slides/slide9.xml><?xml version="1.0" encoding="utf-8"?>
+<p:sld xmlns:a="http://schemas.openxmlformats.org/drawingml/2006/main" xmlns:r="http://schemas.openxmlformats.org/officeDocument/2006/relationships" xmlns:p="http://schemas.openxmlformats.org/presentationml/2006/main">
+  <p:cSld>
+    <p:spTree>
+      <p:nvGrpSpPr>
+        <p:cNvPr id="1" name=""/>
+        <p:cNvGrpSpPr/>
+        <p:nvPr/>
+      </p:nvGrpSpPr>
+      <p:grpSpPr>
+        <a:xfrm>
+          <a:off x="0" y="0"/>
+          <a:ext cx="0" cy="0"/>
+          <a:chOff x="0" y="0"/>
+          <a:chExt cx="0" cy="0"/>
+        </a:xfrm>
+      </p:grpSpPr>
+      <p:sp>
+        <p:nvSpPr>
+          <p:cNvPr id="2" name="Title 1">
+            <a:extLst>
+              <a:ext uri="{FF2B5EF4-FFF2-40B4-BE49-F238E27FC236}">
+                <a16:creationId xmlns:a16="http://schemas.microsoft.com/office/drawing/2014/main" id="{421C3591-CFE4-19C3-3800-C740B7949603}"/>
+              </a:ext>
+            </a:extLst>
+          </p:cNvPr>
+          <p:cNvSpPr>
+            <a:spLocks noGrp="1"/>
+          </p:cNvSpPr>
+          <p:nvPr>
+            <p:ph type="title"/>
+          </p:nvPr>
+        </p:nvSpPr>
+        <p:spPr>
+          <a:xfrm>
+            <a:off x="5476875" y="1303637"/>
+            <a:ext cx="5111750" cy="553481"/>
+          </a:xfrm>
+        </p:spPr>
+        <p:txBody>
+          <a:bodyPr/>
+          <a:lstStyle/>
+          <a:p>
+            <a:r>
+              <a:rPr lang="en-US" dirty="0"/>
+              <a:t>Why </a:t>
+            </a:r>
+            <a:r>
+              <a:rPr lang="en-US" dirty="0" err="1"/>
+              <a:t>Moq</a:t>
+            </a:r>
+            <a:r>
+              <a:rPr lang="en-US" dirty="0"/>
+              <a:t>?</a:t>
+            </a:r>
+          </a:p>
+        </p:txBody>
+      </p:sp>
+      <p:sp>
+        <p:nvSpPr>
+          <p:cNvPr id="3" name="Text Placeholder 2">
+            <a:extLst>
+              <a:ext uri="{FF2B5EF4-FFF2-40B4-BE49-F238E27FC236}">
+                <a16:creationId xmlns:a16="http://schemas.microsoft.com/office/drawing/2014/main" id="{CAD990F4-927A-7B4D-64DB-BEC37B461656}"/>
+              </a:ext>
+            </a:extLst>
+          </p:cNvPr>
+          <p:cNvSpPr>
+            <a:spLocks noGrp="1"/>
+          </p:cNvSpPr>
+          <p:nvPr>
+            <p:ph type="body" idx="1"/>
+          </p:nvPr>
+        </p:nvSpPr>
+        <p:spPr>
+          <a:xfrm>
+            <a:off x="5476875" y="2230395"/>
+            <a:ext cx="5111750" cy="3478427"/>
+          </a:xfrm>
+        </p:spPr>
+        <p:txBody>
+          <a:bodyPr>
+            <a:normAutofit/>
+          </a:bodyPr>
+          <a:lstStyle/>
+          <a:p>
+            <a:pPr marL="285750" indent="-285750">
+              <a:buFont typeface="Arial" panose="020B0604020202020204" pitchFamily="34" charset="0"/>
+              <a:buChar char="•"/>
+            </a:pPr>
+            <a:r>
+              <a:rPr lang="en-US" dirty="0"/>
+              <a:t>Simplified Syntax</a:t>
+            </a:r>
+          </a:p>
+          <a:p>
+            <a:pPr marL="285750" indent="-285750">
+              <a:buFont typeface="Arial" panose="020B0604020202020204" pitchFamily="34" charset="0"/>
+              <a:buChar char="•"/>
+            </a:pPr>
+            <a:r>
+              <a:rPr lang="en-US" dirty="0"/>
+              <a:t>Lambda Expressions</a:t>
+            </a:r>
+          </a:p>
+          <a:p>
+            <a:pPr marL="285750" indent="-285750">
+              <a:buFont typeface="Arial" panose="020B0604020202020204" pitchFamily="34" charset="0"/>
+              <a:buChar char="•"/>
+            </a:pPr>
+            <a:r>
+              <a:rPr lang="en-US" dirty="0"/>
+              <a:t>No Interface Requirements</a:t>
+            </a:r>
+          </a:p>
+          <a:p>
+            <a:pPr marL="285750" indent="-285750">
+              <a:buFont typeface="Arial" panose="020B0604020202020204" pitchFamily="34" charset="0"/>
+              <a:buChar char="•"/>
+            </a:pPr>
+            <a:r>
+              <a:rPr lang="en-US" dirty="0"/>
+              <a:t>Strict Mocking by Default</a:t>
+            </a:r>
+          </a:p>
+          <a:p>
+            <a:pPr marL="285750" indent="-285750">
+              <a:buFont typeface="Arial" panose="020B0604020202020204" pitchFamily="34" charset="0"/>
+              <a:buChar char="•"/>
+            </a:pPr>
+            <a:r>
+              <a:rPr lang="en-US" dirty="0"/>
+              <a:t>Partial Mocking</a:t>
+            </a:r>
+          </a:p>
+          <a:p>
+            <a:pPr marL="285750" indent="-285750">
+              <a:buFont typeface="Arial" panose="020B0604020202020204" pitchFamily="34" charset="0"/>
+              <a:buChar char="•"/>
+            </a:pPr>
+            <a:r>
+              <a:rPr lang="en-US" dirty="0"/>
+              <a:t>Seamless Integration</a:t>
+            </a:r>
+          </a:p>
+          <a:p>
+            <a:pPr marL="285750" indent="-285750">
+              <a:buFont typeface="Arial" panose="020B0604020202020204" pitchFamily="34" charset="0"/>
+              <a:buChar char="•"/>
+            </a:pPr>
+            <a:r>
+              <a:rPr lang="en-US" dirty="0"/>
+              <a:t>Verification of Calls</a:t>
+            </a:r>
+          </a:p>
+          <a:p>
+            <a:pPr marL="285750" indent="-285750">
+              <a:buFont typeface="Arial" panose="020B0604020202020204" pitchFamily="34" charset="0"/>
+              <a:buChar char="•"/>
+            </a:pPr>
+            <a:r>
+              <a:rPr lang="en-US" dirty="0"/>
+              <a:t>No Need for Record and Replay</a:t>
+            </a:r>
+          </a:p>
+          <a:p>
+            <a:pPr marL="285750" indent="-285750">
+              <a:buFont typeface="Arial" panose="020B0604020202020204" pitchFamily="34" charset="0"/>
+              <a:buChar char="•"/>
+            </a:pPr>
+            <a:r>
+              <a:rPr lang="en-US" dirty="0"/>
+              <a:t>Strong Community Support</a:t>
+            </a:r>
+          </a:p>
+          <a:p>
+            <a:pPr marL="285750" indent="-285750">
+              <a:buFont typeface="Arial" panose="020B0604020202020204" pitchFamily="34" charset="0"/>
+              <a:buChar char="•"/>
+            </a:pPr>
+            <a:r>
+              <a:rPr lang="en-US" dirty="0"/>
+              <a:t>Readability and Maintainability</a:t>
+            </a:r>
+          </a:p>
+          <a:p>
+            <a:pPr marL="285750" indent="-285750">
+              <a:buFont typeface="Arial" panose="020B0604020202020204" pitchFamily="34" charset="0"/>
+              <a:buChar char="•"/>
+            </a:pPr>
+            <a:endParaRPr lang="en-US" dirty="0"/>
+          </a:p>
+        </p:txBody>
+      </p:sp>
+      <p:sp>
+        <p:nvSpPr>
+          <p:cNvPr id="4" name="Date Placeholder 3">
+            <a:extLst>
+              <a:ext uri="{FF2B5EF4-FFF2-40B4-BE49-F238E27FC236}">
+                <a16:creationId xmlns:a16="http://schemas.microsoft.com/office/drawing/2014/main" id="{205F9160-F798-4B99-7E36-7629FD7568C3}"/>
+              </a:ext>
+            </a:extLst>
+          </p:cNvPr>
+          <p:cNvSpPr>
+            <a:spLocks noGrp="1"/>
+          </p:cNvSpPr>
+          <p:nvPr>
+            <p:ph type="dt" sz="half" idx="10"/>
+          </p:nvPr>
+        </p:nvSpPr>
+        <p:spPr/>
+        <p:txBody>
+          <a:bodyPr/>
+          <a:lstStyle/>
+          <a:p>
+            <a:r>
+              <a:rPr lang="en-US" dirty="0"/>
+              <a:t>2023</a:t>
+            </a:r>
+          </a:p>
+        </p:txBody>
+      </p:sp>
+      <p:sp>
+        <p:nvSpPr>
+          <p:cNvPr id="5" name="Footer Placeholder 4">
+            <a:extLst>
+              <a:ext uri="{FF2B5EF4-FFF2-40B4-BE49-F238E27FC236}">
+                <a16:creationId xmlns:a16="http://schemas.microsoft.com/office/drawing/2014/main" id="{5AFD9DB7-BE03-6FA0-E368-3AE30AE13F18}"/>
+              </a:ext>
+            </a:extLst>
+          </p:cNvPr>
+          <p:cNvSpPr>
+            <a:spLocks noGrp="1"/>
+          </p:cNvSpPr>
+          <p:nvPr>
+            <p:ph type="ftr" sz="quarter" idx="11"/>
+          </p:nvPr>
+        </p:nvSpPr>
+        <p:spPr/>
+        <p:txBody>
+          <a:bodyPr/>
+          <a:lstStyle/>
+          <a:p>
+            <a:r>
+              <a:rPr lang="en-US" dirty="0"/>
+              <a:t>Unit testing  with Xunit.net &amp; MOQ</a:t>
+            </a:r>
+          </a:p>
+        </p:txBody>
+      </p:sp>
+      <p:sp>
+        <p:nvSpPr>
+          <p:cNvPr id="6" name="Slide Number Placeholder 5">
+            <a:extLst>
+              <a:ext uri="{FF2B5EF4-FFF2-40B4-BE49-F238E27FC236}">
+                <a16:creationId xmlns:a16="http://schemas.microsoft.com/office/drawing/2014/main" id="{1593F57E-B6AE-B9E5-EB77-283BA94280E1}"/>
+              </a:ext>
+            </a:extLst>
+          </p:cNvPr>
+          <p:cNvSpPr>
+            <a:spLocks noGrp="1"/>
+          </p:cNvSpPr>
+          <p:nvPr>
+            <p:ph type="sldNum" sz="quarter" idx="12"/>
+          </p:nvPr>
+        </p:nvSpPr>
+        <p:spPr/>
+        <p:txBody>
+          <a:bodyPr/>
+          <a:lstStyle/>
+          <a:p>
+            <a:fld id="{A49DFD55-3C28-40EF-9E31-A92D2E4017FF}" type="slidenum">
+              <a:rPr lang="en-US" smtClean="0"/>
+              <a:pPr/>
+              <a:t>9</a:t>
+            </a:fld>
+            <a:endParaRPr lang="en-US" dirty="0"/>
+          </a:p>
+        </p:txBody>
+      </p:sp>
+    </p:spTree>
+    <p:extLst>
+      <p:ext uri="{BB962C8B-B14F-4D97-AF65-F5344CB8AC3E}">
+        <p14:creationId xmlns:p14="http://schemas.microsoft.com/office/powerpoint/2010/main" val="602447409"/>
       </p:ext>
     </p:extLst>
   </p:cSld>
@@ -13162,22 +13698,12 @@
 </file>
 
 <file path=customXml/item1.xml><?xml version="1.0" encoding="utf-8"?>
-<p:properties xmlns:p="http://schemas.microsoft.com/office/2006/metadata/properties" xmlns:xsi="http://www.w3.org/2001/XMLSchema-instance" xmlns:pc="http://schemas.microsoft.com/office/infopath/2007/PartnerControls">
-  <documentManagement>
-    <_ip_UnifiedCompliancePolicyUIAction xmlns="http://schemas.microsoft.com/sharepoint/v3" xsi:nil="true"/>
-    <Image xmlns="71af3243-3dd4-4a8d-8c0d-dd76da1f02a5">
-      <Url xsi:nil="true"/>
-      <Description xsi:nil="true"/>
-    </Image>
-    <Status xmlns="71af3243-3dd4-4a8d-8c0d-dd76da1f02a5">Not started</Status>
-    <_ip_UnifiedCompliancePolicyProperties xmlns="http://schemas.microsoft.com/sharepoint/v3" xsi:nil="true"/>
-    <ImageTagsTaxHTField xmlns="71af3243-3dd4-4a8d-8c0d-dd76da1f02a5">
-      <Terms xmlns="http://schemas.microsoft.com/office/infopath/2007/PartnerControls"/>
-    </ImageTagsTaxHTField>
-    <TaxCatchAll xmlns="230e9df3-be65-4c73-a93b-d1236ebd677e"/>
-    <MediaServiceKeyPoints xmlns="71af3243-3dd4-4a8d-8c0d-dd76da1f02a5" xsi:nil="true"/>
-  </documentManagement>
-</p:properties>
+<?mso-contentType ?>
+<FormTemplates xmlns="http://schemas.microsoft.com/sharepoint/v3/contenttype/forms">
+  <Display>DocumentLibraryForm</Display>
+  <Edit>DocumentLibraryForm</Edit>
+  <New>DocumentLibraryForm</New>
+</FormTemplates>
 </file>
 
 <file path=customXml/item2.xml><?xml version="1.0" encoding="utf-8"?>
@@ -13457,22 +13983,28 @@
 </file>
 
 <file path=customXml/item3.xml><?xml version="1.0" encoding="utf-8"?>
-<?mso-contentType ?>
-<FormTemplates xmlns="http://schemas.microsoft.com/sharepoint/v3/contenttype/forms">
-  <Display>DocumentLibraryForm</Display>
-  <Edit>DocumentLibraryForm</Edit>
-  <New>DocumentLibraryForm</New>
-</FormTemplates>
+<p:properties xmlns:p="http://schemas.microsoft.com/office/2006/metadata/properties" xmlns:xsi="http://www.w3.org/2001/XMLSchema-instance" xmlns:pc="http://schemas.microsoft.com/office/infopath/2007/PartnerControls">
+  <documentManagement>
+    <_ip_UnifiedCompliancePolicyUIAction xmlns="http://schemas.microsoft.com/sharepoint/v3" xsi:nil="true"/>
+    <Image xmlns="71af3243-3dd4-4a8d-8c0d-dd76da1f02a5">
+      <Url xsi:nil="true"/>
+      <Description xsi:nil="true"/>
+    </Image>
+    <Status xmlns="71af3243-3dd4-4a8d-8c0d-dd76da1f02a5">Not started</Status>
+    <_ip_UnifiedCompliancePolicyProperties xmlns="http://schemas.microsoft.com/sharepoint/v3" xsi:nil="true"/>
+    <ImageTagsTaxHTField xmlns="71af3243-3dd4-4a8d-8c0d-dd76da1f02a5">
+      <Terms xmlns="http://schemas.microsoft.com/office/infopath/2007/PartnerControls"/>
+    </ImageTagsTaxHTField>
+    <TaxCatchAll xmlns="230e9df3-be65-4c73-a93b-d1236ebd677e"/>
+    <MediaServiceKeyPoints xmlns="71af3243-3dd4-4a8d-8c0d-dd76da1f02a5" xsi:nil="true"/>
+  </documentManagement>
+</p:properties>
 </file>
 
 <file path=customXml/itemProps1.xml><?xml version="1.0" encoding="utf-8"?>
-<ds:datastoreItem xmlns:ds="http://schemas.openxmlformats.org/officeDocument/2006/customXml" ds:itemID="{29C43685-694E-4579-B109-3C418D49DA65}">
+<ds:datastoreItem xmlns:ds="http://schemas.openxmlformats.org/officeDocument/2006/customXml" ds:itemID="{0FD6FE22-81A0-4500-AFD0-342D21BB9A2C}">
   <ds:schemaRefs>
-    <ds:schemaRef ds:uri="http://schemas.microsoft.com/office/2006/metadata/properties"/>
-    <ds:schemaRef ds:uri="http://schemas.microsoft.com/office/infopath/2007/PartnerControls"/>
-    <ds:schemaRef ds:uri="http://schemas.microsoft.com/sharepoint/v3"/>
-    <ds:schemaRef ds:uri="71af3243-3dd4-4a8d-8c0d-dd76da1f02a5"/>
-    <ds:schemaRef ds:uri="230e9df3-be65-4c73-a93b-d1236ebd677e"/>
+    <ds:schemaRef ds:uri="http://schemas.microsoft.com/sharepoint/v3/contenttype/forms"/>
   </ds:schemaRefs>
 </ds:datastoreItem>
 </file>
@@ -13499,9 +14031,13 @@
 </file>
 
 <file path=customXml/itemProps3.xml><?xml version="1.0" encoding="utf-8"?>
-<ds:datastoreItem xmlns:ds="http://schemas.openxmlformats.org/officeDocument/2006/customXml" ds:itemID="{0FD6FE22-81A0-4500-AFD0-342D21BB9A2C}">
+<ds:datastoreItem xmlns:ds="http://schemas.openxmlformats.org/officeDocument/2006/customXml" ds:itemID="{29C43685-694E-4579-B109-3C418D49DA65}">
   <ds:schemaRefs>
-    <ds:schemaRef ds:uri="http://schemas.microsoft.com/sharepoint/v3/contenttype/forms"/>
+    <ds:schemaRef ds:uri="http://schemas.microsoft.com/office/2006/metadata/properties"/>
+    <ds:schemaRef ds:uri="http://schemas.microsoft.com/office/infopath/2007/PartnerControls"/>
+    <ds:schemaRef ds:uri="http://schemas.microsoft.com/sharepoint/v3"/>
+    <ds:schemaRef ds:uri="71af3243-3dd4-4a8d-8c0d-dd76da1f02a5"/>
+    <ds:schemaRef ds:uri="230e9df3-be65-4c73-a93b-d1236ebd677e"/>
   </ds:schemaRefs>
 </ds:datastoreItem>
 </file>

</xml_diff>

<commit_message>
Adding MOQ notes to the presentation
</commit_message>
<xml_diff>
--- a/Presentation/Unit Testing with Xunit - Moq.pptx
+++ b/Presentation/Unit Testing with Xunit - Moq.pptx
@@ -1812,7 +1812,64 @@
           <a:bodyPr/>
           <a:lstStyle/>
           <a:p>
+            <a:r>
+              <a:rPr lang="en-US" dirty="0"/>
+              <a:t>- </a:t>
+            </a:r>
+            <a:r>
+              <a:rPr lang="en-US" dirty="0" err="1"/>
+              <a:t>Moq</a:t>
+            </a:r>
+            <a:r>
+              <a:rPr lang="en-US" dirty="0"/>
+              <a:t> (pronounced "mock") is a popular mocking framework for .NET development that aids in unit testing by creating mock objects.</a:t>
+            </a:r>
+          </a:p>
+          <a:p>
             <a:endParaRPr lang="en-US" dirty="0"/>
+          </a:p>
+          <a:p>
+            <a:r>
+              <a:rPr lang="en-US" dirty="0"/>
+              <a:t>- This </a:t>
+            </a:r>
+            <a:r>
+              <a:rPr lang="en-US" dirty="0" err="1"/>
+              <a:t>Moq</a:t>
+            </a:r>
+            <a:r>
+              <a:rPr lang="en-US" dirty="0"/>
+              <a:t> framework was created by Daniel </a:t>
+            </a:r>
+            <a:r>
+              <a:rPr lang="en-US" dirty="0" err="1"/>
+              <a:t>Cazzulino</a:t>
+            </a:r>
+            <a:r>
+              <a:rPr lang="en-US" dirty="0"/>
+              <a:t> from Argentina and has been in active development since 2009 and it has being downloaded from NuGet around 500 million times.</a:t>
+            </a:r>
+          </a:p>
+          <a:p>
+            <a:r>
+              <a:rPr lang="en-US" dirty="0"/>
+              <a:t> </a:t>
+            </a:r>
+          </a:p>
+          <a:p>
+            <a:r>
+              <a:rPr lang="en-US" dirty="0"/>
+              <a:t>- Its primary purpose is to facilitate unit testing by allowing you to create mock objects that simulate the behavior of real objects </a:t>
+            </a:r>
+          </a:p>
+          <a:p>
+            <a:endParaRPr lang="en-US" dirty="0"/>
+          </a:p>
+          <a:p>
+            <a:r>
+              <a:rPr lang="en-US" dirty="0"/>
+              <a:t>- These mock objects can be used to isolate the code you want to test and to control the behavior of dependencies, making it easier to verify the correctness of your code.</a:t>
+            </a:r>
           </a:p>
         </p:txBody>
       </p:sp>
@@ -1896,7 +1953,223 @@
           <a:bodyPr/>
           <a:lstStyle/>
           <a:p>
+            <a:r>
+              <a:rPr lang="en-US" dirty="0"/>
+              <a:t>- Who uses: in addition to these projects there are other Microsoft teams that use this tool as Microsoft Core Systems, 1PACS, 3PACS and many more</a:t>
+            </a:r>
+            <a:endParaRPr lang="en-029" dirty="0"/>
+          </a:p>
+        </p:txBody>
+      </p:sp>
+      <p:sp>
+        <p:nvSpPr>
+          <p:cNvPr id="4" name="Slide Number Placeholder 3"/>
+          <p:cNvSpPr>
+            <a:spLocks noGrp="1"/>
+          </p:cNvSpPr>
+          <p:nvPr>
+            <p:ph type="sldNum" sz="quarter" idx="5"/>
+          </p:nvPr>
+        </p:nvSpPr>
+        <p:spPr/>
+        <p:txBody>
+          <a:bodyPr/>
+          <a:lstStyle/>
+          <a:p>
+            <a:fld id="{22289C57-55D7-40A4-A101-E74FAC7A092B}" type="slidenum">
+              <a:rPr lang="en-US" smtClean="0"/>
+              <a:t>8</a:t>
+            </a:fld>
             <a:endParaRPr lang="en-US" dirty="0"/>
+          </a:p>
+        </p:txBody>
+      </p:sp>
+    </p:spTree>
+    <p:extLst>
+      <p:ext uri="{BB962C8B-B14F-4D97-AF65-F5344CB8AC3E}">
+        <p14:creationId xmlns:p14="http://schemas.microsoft.com/office/powerpoint/2010/main" val="811147357"/>
+      </p:ext>
+    </p:extLst>
+  </p:cSld>
+  <p:clrMapOvr>
+    <a:masterClrMapping/>
+  </p:clrMapOvr>
+</p:notes>
+</file>
+
+<file path=ppt/notesSlides/notesSlide8.xml><?xml version="1.0" encoding="utf-8"?>
+<p:notes xmlns:a="http://schemas.openxmlformats.org/drawingml/2006/main" xmlns:r="http://schemas.openxmlformats.org/officeDocument/2006/relationships" xmlns:p="http://schemas.openxmlformats.org/presentationml/2006/main">
+  <p:cSld>
+    <p:spTree>
+      <p:nvGrpSpPr>
+        <p:cNvPr id="1" name=""/>
+        <p:cNvGrpSpPr/>
+        <p:nvPr/>
+      </p:nvGrpSpPr>
+      <p:grpSpPr>
+        <a:xfrm>
+          <a:off x="0" y="0"/>
+          <a:ext cx="0" cy="0"/>
+          <a:chOff x="0" y="0"/>
+          <a:chExt cx="0" cy="0"/>
+        </a:xfrm>
+      </p:grpSpPr>
+      <p:sp>
+        <p:nvSpPr>
+          <p:cNvPr id="2" name="Slide Image Placeholder 1"/>
+          <p:cNvSpPr>
+            <a:spLocks noGrp="1" noRot="1" noChangeAspect="1"/>
+          </p:cNvSpPr>
+          <p:nvPr>
+            <p:ph type="sldImg"/>
+          </p:nvPr>
+        </p:nvSpPr>
+        <p:spPr/>
+      </p:sp>
+      <p:sp>
+        <p:nvSpPr>
+          <p:cNvPr id="3" name="Notes Placeholder 2"/>
+          <p:cNvSpPr>
+            <a:spLocks noGrp="1"/>
+          </p:cNvSpPr>
+          <p:nvPr>
+            <p:ph type="body" idx="1"/>
+          </p:nvPr>
+        </p:nvSpPr>
+        <p:spPr/>
+        <p:txBody>
+          <a:bodyPr/>
+          <a:lstStyle/>
+          <a:p>
+            <a:endParaRPr lang="en-US" dirty="0"/>
+          </a:p>
+          <a:p>
+            <a:r>
+              <a:rPr lang="en-US" dirty="0"/>
+              <a:t>- Why MOQ: In essence, </a:t>
+            </a:r>
+            <a:r>
+              <a:rPr lang="en-US" dirty="0" err="1"/>
+              <a:t>Moq</a:t>
+            </a:r>
+            <a:r>
+              <a:rPr lang="en-US" dirty="0"/>
+              <a:t> empowers you to write more efficient unit tests by providing a flexible and intuitive way to create and manipulate mock objects. This allows you to catch bugs early, improve code quality, and build more reliable software. These are some of the features</a:t>
+            </a:r>
+          </a:p>
+          <a:p>
+            <a:endParaRPr lang="en-US" dirty="0"/>
+          </a:p>
+          <a:p>
+            <a:endParaRPr lang="en-US" dirty="0"/>
+          </a:p>
+          <a:p>
+            <a:r>
+              <a:rPr lang="en-US" dirty="0"/>
+              <a:t>- Compared to some other mocking frameworks MOQ provides a concise and easy-to-understand syntax</a:t>
+            </a:r>
+          </a:p>
+          <a:p>
+            <a:endParaRPr lang="en-US" dirty="0"/>
+          </a:p>
+          <a:p>
+            <a:r>
+              <a:rPr lang="en-US" dirty="0"/>
+              <a:t>- Use lambda expressions to set up mock behavior resulting in cleaner and more readable code</a:t>
+            </a:r>
+          </a:p>
+          <a:p>
+            <a:endParaRPr lang="en-US" dirty="0"/>
+          </a:p>
+          <a:p>
+            <a:r>
+              <a:rPr lang="en-US" dirty="0"/>
+              <a:t>- MOQ can mock both interfaces and concrete classes</a:t>
+            </a:r>
+          </a:p>
+          <a:p>
+            <a:endParaRPr lang="en-US" dirty="0"/>
+          </a:p>
+          <a:p>
+            <a:r>
+              <a:rPr lang="en-US" dirty="0"/>
+              <a:t>- MOQ is strict by default, meaning it throws exceptions for unexpected calls</a:t>
+            </a:r>
+          </a:p>
+          <a:p>
+            <a:endParaRPr lang="en-US" dirty="0"/>
+          </a:p>
+          <a:p>
+            <a:r>
+              <a:rPr lang="en-US" dirty="0"/>
+              <a:t>- MOQ supports partial mocking, allowing developers to mock only specific methods of an object </a:t>
+            </a:r>
+          </a:p>
+          <a:p>
+            <a:endParaRPr lang="en-US" dirty="0"/>
+          </a:p>
+          <a:p>
+            <a:r>
+              <a:rPr lang="en-US" dirty="0"/>
+              <a:t>- MOQ integrates with popular unit testing frameworks like </a:t>
+            </a:r>
+            <a:r>
+              <a:rPr lang="en-US" dirty="0" err="1"/>
+              <a:t>XUnit</a:t>
+            </a:r>
+            <a:r>
+              <a:rPr lang="en-US" dirty="0"/>
+              <a:t>, </a:t>
+            </a:r>
+            <a:r>
+              <a:rPr lang="en-US" dirty="0" err="1"/>
+              <a:t>NUnit</a:t>
+            </a:r>
+            <a:r>
+              <a:rPr lang="en-US" dirty="0"/>
+              <a:t>, and </a:t>
+            </a:r>
+            <a:r>
+              <a:rPr lang="en-US" dirty="0" err="1"/>
+              <a:t>MSTest</a:t>
+            </a:r>
+            <a:endParaRPr lang="en-US" dirty="0"/>
+          </a:p>
+          <a:p>
+            <a:endParaRPr lang="en-US" dirty="0"/>
+          </a:p>
+          <a:p>
+            <a:r>
+              <a:rPr lang="en-US" dirty="0"/>
+              <a:t>- MOQ provides verification methods to ensure that specific methods are called with the correct parameters during testing</a:t>
+            </a:r>
+          </a:p>
+          <a:p>
+            <a:endParaRPr lang="en-US" dirty="0"/>
+          </a:p>
+          <a:p>
+            <a:r>
+              <a:rPr lang="en-US" dirty="0"/>
+              <a:t>- Unlike some older mocking frameworks, MOQ does not require a separate "record" and "replay"</a:t>
+            </a:r>
+          </a:p>
+          <a:p>
+            <a:endParaRPr lang="en-US" dirty="0"/>
+          </a:p>
+          <a:p>
+            <a:r>
+              <a:rPr lang="en-US" dirty="0"/>
+              <a:t>- MOQ has a strong and active community, resulting in regular updates, bug fixes, and continuous improvements</a:t>
+            </a:r>
+          </a:p>
+          <a:p>
+            <a:endParaRPr lang="en-US" dirty="0"/>
+          </a:p>
+          <a:p>
+            <a:r>
+              <a:rPr lang="en-US" dirty="0"/>
+              <a:t>- MOQ's syntax promotes clear and maintainable tests, contributing to better code readability and easier maintenance </a:t>
+            </a:r>
           </a:p>
         </p:txBody>
       </p:sp>
@@ -1927,6 +2200,90 @@
     <p:extLst>
       <p:ext uri="{BB962C8B-B14F-4D97-AF65-F5344CB8AC3E}">
         <p14:creationId xmlns:p14="http://schemas.microsoft.com/office/powerpoint/2010/main" val="2426429702"/>
+      </p:ext>
+    </p:extLst>
+  </p:cSld>
+  <p:clrMapOvr>
+    <a:masterClrMapping/>
+  </p:clrMapOvr>
+</p:notes>
+</file>
+
+<file path=ppt/notesSlides/notesSlide9.xml><?xml version="1.0" encoding="utf-8"?>
+<p:notes xmlns:a="http://schemas.openxmlformats.org/drawingml/2006/main" xmlns:r="http://schemas.openxmlformats.org/officeDocument/2006/relationships" xmlns:p="http://schemas.openxmlformats.org/presentationml/2006/main">
+  <p:cSld>
+    <p:spTree>
+      <p:nvGrpSpPr>
+        <p:cNvPr id="1" name=""/>
+        <p:cNvGrpSpPr/>
+        <p:nvPr/>
+      </p:nvGrpSpPr>
+      <p:grpSpPr>
+        <a:xfrm>
+          <a:off x="0" y="0"/>
+          <a:ext cx="0" cy="0"/>
+          <a:chOff x="0" y="0"/>
+          <a:chExt cx="0" cy="0"/>
+        </a:xfrm>
+      </p:grpSpPr>
+      <p:sp>
+        <p:nvSpPr>
+          <p:cNvPr id="2" name="Slide Image Placeholder 1"/>
+          <p:cNvSpPr>
+            <a:spLocks noGrp="1" noRot="1" noChangeAspect="1"/>
+          </p:cNvSpPr>
+          <p:nvPr>
+            <p:ph type="sldImg"/>
+          </p:nvPr>
+        </p:nvSpPr>
+        <p:spPr/>
+      </p:sp>
+      <p:sp>
+        <p:nvSpPr>
+          <p:cNvPr id="3" name="Notes Placeholder 2"/>
+          <p:cNvSpPr>
+            <a:spLocks noGrp="1"/>
+          </p:cNvSpPr>
+          <p:nvPr>
+            <p:ph type="body" idx="1"/>
+          </p:nvPr>
+        </p:nvSpPr>
+        <p:spPr/>
+        <p:txBody>
+          <a:bodyPr/>
+          <a:lstStyle/>
+          <a:p>
+            <a:endParaRPr lang="en-029" dirty="0"/>
+          </a:p>
+        </p:txBody>
+      </p:sp>
+      <p:sp>
+        <p:nvSpPr>
+          <p:cNvPr id="4" name="Slide Number Placeholder 3"/>
+          <p:cNvSpPr>
+            <a:spLocks noGrp="1"/>
+          </p:cNvSpPr>
+          <p:nvPr>
+            <p:ph type="sldNum" sz="quarter" idx="5"/>
+          </p:nvPr>
+        </p:nvSpPr>
+        <p:spPr/>
+        <p:txBody>
+          <a:bodyPr/>
+          <a:lstStyle/>
+          <a:p>
+            <a:fld id="{22289C57-55D7-40A4-A101-E74FAC7A092B}" type="slidenum">
+              <a:rPr lang="en-US" smtClean="0"/>
+              <a:t>10</a:t>
+            </a:fld>
+            <a:endParaRPr lang="en-US" dirty="0"/>
+          </a:p>
+        </p:txBody>
+      </p:sp>
+    </p:spTree>
+    <p:extLst>
+      <p:ext uri="{BB962C8B-B14F-4D97-AF65-F5344CB8AC3E}">
+        <p14:creationId xmlns:p14="http://schemas.microsoft.com/office/powerpoint/2010/main" val="1740135870"/>
       </p:ext>
     </p:extLst>
   </p:cSld>
@@ -12671,7 +13028,7 @@
             </a:r>
             <a:r>
               <a:rPr lang="en-US" dirty="0">
-                <a:hlinkClick r:id="rId2"/>
+                <a:hlinkClick r:id="rId3"/>
               </a:rPr>
               <a:t>https://github.com/microsoft/PowerToys</a:t>
             </a:r>
@@ -12695,7 +13052,7 @@
             </a:r>
             <a:r>
               <a:rPr lang="en-US" dirty="0">
-                <a:hlinkClick r:id="rId3"/>
+                <a:hlinkClick r:id="rId4"/>
               </a:rPr>
               <a:t>https://github.com/Wox-launcher/Wox</a:t>
             </a:r>
@@ -12715,7 +13072,7 @@
             </a:r>
             <a:r>
               <a:rPr lang="en-US" dirty="0">
-                <a:hlinkClick r:id="rId4"/>
+                <a:hlinkClick r:id="rId5"/>
               </a:rPr>
               <a:t>https://github.com/AvaloniaUI/Avalonia</a:t>
             </a:r>
@@ -12739,7 +13096,7 @@
             </a:r>
             <a:r>
               <a:rPr lang="en-US" dirty="0">
-                <a:hlinkClick r:id="rId5"/>
+                <a:hlinkClick r:id="rId6"/>
               </a:rPr>
               <a:t>https://github.com/jellyfin/jellyfin</a:t>
             </a:r>
@@ -13941,12 +14298,22 @@
 </file>
 
 <file path=customXml/item1.xml><?xml version="1.0" encoding="utf-8"?>
-<?mso-contentType ?>
-<FormTemplates xmlns="http://schemas.microsoft.com/sharepoint/v3/contenttype/forms">
-  <Display>DocumentLibraryForm</Display>
-  <Edit>DocumentLibraryForm</Edit>
-  <New>DocumentLibraryForm</New>
-</FormTemplates>
+<p:properties xmlns:p="http://schemas.microsoft.com/office/2006/metadata/properties" xmlns:xsi="http://www.w3.org/2001/XMLSchema-instance" xmlns:pc="http://schemas.microsoft.com/office/infopath/2007/PartnerControls">
+  <documentManagement>
+    <_ip_UnifiedCompliancePolicyUIAction xmlns="http://schemas.microsoft.com/sharepoint/v3" xsi:nil="true"/>
+    <Image xmlns="71af3243-3dd4-4a8d-8c0d-dd76da1f02a5">
+      <Url xsi:nil="true"/>
+      <Description xsi:nil="true"/>
+    </Image>
+    <Status xmlns="71af3243-3dd4-4a8d-8c0d-dd76da1f02a5">Not started</Status>
+    <_ip_UnifiedCompliancePolicyProperties xmlns="http://schemas.microsoft.com/sharepoint/v3" xsi:nil="true"/>
+    <ImageTagsTaxHTField xmlns="71af3243-3dd4-4a8d-8c0d-dd76da1f02a5">
+      <Terms xmlns="http://schemas.microsoft.com/office/infopath/2007/PartnerControls"/>
+    </ImageTagsTaxHTField>
+    <TaxCatchAll xmlns="230e9df3-be65-4c73-a93b-d1236ebd677e"/>
+    <MediaServiceKeyPoints xmlns="71af3243-3dd4-4a8d-8c0d-dd76da1f02a5" xsi:nil="true"/>
+  </documentManagement>
+</p:properties>
 </file>
 
 <file path=customXml/item2.xml><?xml version="1.0" encoding="utf-8"?>
@@ -14226,28 +14593,22 @@
 </file>
 
 <file path=customXml/item3.xml><?xml version="1.0" encoding="utf-8"?>
-<p:properties xmlns:p="http://schemas.microsoft.com/office/2006/metadata/properties" xmlns:xsi="http://www.w3.org/2001/XMLSchema-instance" xmlns:pc="http://schemas.microsoft.com/office/infopath/2007/PartnerControls">
-  <documentManagement>
-    <_ip_UnifiedCompliancePolicyUIAction xmlns="http://schemas.microsoft.com/sharepoint/v3" xsi:nil="true"/>
-    <Image xmlns="71af3243-3dd4-4a8d-8c0d-dd76da1f02a5">
-      <Url xsi:nil="true"/>
-      <Description xsi:nil="true"/>
-    </Image>
-    <Status xmlns="71af3243-3dd4-4a8d-8c0d-dd76da1f02a5">Not started</Status>
-    <_ip_UnifiedCompliancePolicyProperties xmlns="http://schemas.microsoft.com/sharepoint/v3" xsi:nil="true"/>
-    <ImageTagsTaxHTField xmlns="71af3243-3dd4-4a8d-8c0d-dd76da1f02a5">
-      <Terms xmlns="http://schemas.microsoft.com/office/infopath/2007/PartnerControls"/>
-    </ImageTagsTaxHTField>
-    <TaxCatchAll xmlns="230e9df3-be65-4c73-a93b-d1236ebd677e"/>
-    <MediaServiceKeyPoints xmlns="71af3243-3dd4-4a8d-8c0d-dd76da1f02a5" xsi:nil="true"/>
-  </documentManagement>
-</p:properties>
+<?mso-contentType ?>
+<FormTemplates xmlns="http://schemas.microsoft.com/sharepoint/v3/contenttype/forms">
+  <Display>DocumentLibraryForm</Display>
+  <Edit>DocumentLibraryForm</Edit>
+  <New>DocumentLibraryForm</New>
+</FormTemplates>
 </file>
 
 <file path=customXml/itemProps1.xml><?xml version="1.0" encoding="utf-8"?>
-<ds:datastoreItem xmlns:ds="http://schemas.openxmlformats.org/officeDocument/2006/customXml" ds:itemID="{0FD6FE22-81A0-4500-AFD0-342D21BB9A2C}">
+<ds:datastoreItem xmlns:ds="http://schemas.openxmlformats.org/officeDocument/2006/customXml" ds:itemID="{29C43685-694E-4579-B109-3C418D49DA65}">
   <ds:schemaRefs>
-    <ds:schemaRef ds:uri="http://schemas.microsoft.com/sharepoint/v3/contenttype/forms"/>
+    <ds:schemaRef ds:uri="http://schemas.microsoft.com/office/2006/metadata/properties"/>
+    <ds:schemaRef ds:uri="http://schemas.microsoft.com/office/infopath/2007/PartnerControls"/>
+    <ds:schemaRef ds:uri="http://schemas.microsoft.com/sharepoint/v3"/>
+    <ds:schemaRef ds:uri="71af3243-3dd4-4a8d-8c0d-dd76da1f02a5"/>
+    <ds:schemaRef ds:uri="230e9df3-be65-4c73-a93b-d1236ebd677e"/>
   </ds:schemaRefs>
 </ds:datastoreItem>
 </file>
@@ -14274,13 +14635,9 @@
 </file>
 
 <file path=customXml/itemProps3.xml><?xml version="1.0" encoding="utf-8"?>
-<ds:datastoreItem xmlns:ds="http://schemas.openxmlformats.org/officeDocument/2006/customXml" ds:itemID="{29C43685-694E-4579-B109-3C418D49DA65}">
+<ds:datastoreItem xmlns:ds="http://schemas.openxmlformats.org/officeDocument/2006/customXml" ds:itemID="{0FD6FE22-81A0-4500-AFD0-342D21BB9A2C}">
   <ds:schemaRefs>
-    <ds:schemaRef ds:uri="http://schemas.microsoft.com/office/2006/metadata/properties"/>
-    <ds:schemaRef ds:uri="http://schemas.microsoft.com/office/infopath/2007/PartnerControls"/>
-    <ds:schemaRef ds:uri="http://schemas.microsoft.com/sharepoint/v3"/>
-    <ds:schemaRef ds:uri="71af3243-3dd4-4a8d-8c0d-dd76da1f02a5"/>
-    <ds:schemaRef ds:uri="230e9df3-be65-4c73-a93b-d1236ebd677e"/>
+    <ds:schemaRef ds:uri="http://schemas.microsoft.com/sharepoint/v3/contenttype/forms"/>
   </ds:schemaRefs>
 </ds:datastoreItem>
 </file>

</xml_diff>

<commit_message>
Updated presentation with a few minor fixes.
</commit_message>
<xml_diff>
--- a/Presentation/Unit Testing with Xunit - Moq.pptx
+++ b/Presentation/Unit Testing with Xunit - Moq.pptx
@@ -385,7 +385,7 @@
           <a:p>
             <a:fld id="{B56F32FC-4BD9-442A-A8C6-51598C909FE3}" type="datetimeFigureOut">
               <a:rPr lang="en-US" smtClean="0"/>
-              <a:t>8/10/2023</a:t>
+              <a:t>8/11/2023</a:t>
             </a:fld>
             <a:endParaRPr lang="en-US" dirty="0"/>
           </a:p>
@@ -562,7 +562,7 @@
           <a:p>
             <a:fld id="{056371FA-A98D-41E8-93F4-09945841298A}" type="datetimeFigureOut">
               <a:rPr lang="en-US" smtClean="0"/>
-              <a:t>8/10/2023</a:t>
+              <a:t>8/11/2023</a:t>
             </a:fld>
             <a:endParaRPr lang="en-US" dirty="0"/>
           </a:p>
@@ -1293,7 +1293,7 @@
           <a:p>
             <a:r>
               <a:rPr lang="en-US" dirty="0"/>
-              <a:t>- It has a stable release version since 2002 and it is currently part of the dotnet foundation. </a:t>
+              <a:t>- It has a stable release version in 2002 and currently it is part of the dotnet foundation. </a:t>
             </a:r>
           </a:p>
           <a:p>
@@ -1335,7 +1335,7 @@
           <a:p>
             <a:r>
               <a:rPr lang="en-US" dirty="0"/>
-              <a:t>-  It allows us the possibility of configuring the framework as we see fit.</a:t>
+              <a:t>-  It allows us the possibility of configuring our tests as we see fit.</a:t>
             </a:r>
           </a:p>
           <a:p>
@@ -1344,16 +1344,36 @@
           <a:p>
             <a:r>
               <a:rPr lang="en-US" dirty="0"/>
+              <a:t>- and specific environments, not only for the design of our tests but also for the execution of these via the runners.</a:t>
+            </a:r>
+          </a:p>
+          <a:p>
+            <a:endParaRPr lang="en-US" dirty="0"/>
+          </a:p>
+          <a:p>
+            <a:endParaRPr lang="en-US" dirty="0"/>
+          </a:p>
+          <a:p>
+            <a:pPr marL="0" marR="0" lvl="0" indent="0" algn="l" defTabSz="914400" rtl="0" eaLnBrk="1" fontAlgn="auto" latinLnBrk="0" hangingPunct="1">
+              <a:lnSpc>
+                <a:spcPct val="100000"/>
+              </a:lnSpc>
+              <a:spcBef>
+                <a:spcPts val="0"/>
+              </a:spcBef>
+              <a:spcAft>
+                <a:spcPts val="0"/>
+              </a:spcAft>
+              <a:buClrTx/>
+              <a:buSzTx/>
+              <a:buFontTx/>
+              <a:buNone/>
+              <a:tabLst/>
+              <a:defRPr/>
+            </a:pPr>
+            <a:r>
+              <a:rPr lang="en-US" dirty="0"/>
               <a:t>- We will see some examples of these later and how these components can affect our tests design.</a:t>
-            </a:r>
-          </a:p>
-          <a:p>
-            <a:endParaRPr lang="en-US" dirty="0"/>
-          </a:p>
-          <a:p>
-            <a:r>
-              <a:rPr lang="en-US" dirty="0"/>
-              <a:t>- and specific environments, not only for the design of our tests but also for the execution of these via the runners.</a:t>
             </a:r>
           </a:p>
           <a:p>
@@ -1457,7 +1477,23 @@
           <a:p>
             <a:r>
               <a:rPr lang="en-US" dirty="0"/>
-              <a:t>- Aside from the core dotnet/</a:t>
+              <a:t>- </a:t>
+            </a:r>
+            <a:r>
+              <a:rPr lang="en-US" dirty="0" err="1"/>
+              <a:t>Winforms</a:t>
+            </a:r>
+            <a:r>
+              <a:rPr lang="en-US" dirty="0"/>
+              <a:t>, </a:t>
+            </a:r>
+            <a:r>
+              <a:rPr lang="en-US" dirty="0" err="1"/>
+              <a:t>wpf</a:t>
+            </a:r>
+            <a:r>
+              <a:rPr lang="en-US" dirty="0"/>
+              <a:t>, </a:t>
             </a:r>
             <a:r>
               <a:rPr lang="en-US" dirty="0" err="1"/>
@@ -1465,7 +1501,15 @@
             </a:r>
             <a:r>
               <a:rPr lang="en-US" dirty="0"/>
-              <a:t> team, a bunch of Open-source libraries like Dapper, </a:t>
+              <a:t>, even the </a:t>
+            </a:r>
+            <a:r>
+              <a:rPr lang="en-US" dirty="0" err="1"/>
+              <a:t>sdk</a:t>
+            </a:r>
+            <a:r>
+              <a:rPr lang="en-US" dirty="0"/>
+              <a:t> installers. a bunch of Open-source libraries like Dapper, </a:t>
             </a:r>
             <a:r>
               <a:rPr lang="en-US" dirty="0" err="1"/>
@@ -1515,7 +1559,7 @@
             </a:r>
             <a:r>
               <a:rPr lang="en-US" dirty="0" err="1"/>
-              <a:t>SignTools</a:t>
+              <a:t>Sign.SignTools.SpecSign</a:t>
             </a:r>
             <a:r>
               <a:rPr lang="en-US" dirty="0"/>
@@ -1523,7 +1567,7 @@
             </a:r>
             <a:r>
               <a:rPr lang="en-US" dirty="0" err="1"/>
-              <a:t>NotationPlugin</a:t>
+              <a:t>Acs.Client.NotationPlugin</a:t>
             </a:r>
             <a:r>
               <a:rPr lang="en-US" dirty="0"/>
@@ -11463,7 +11507,7 @@
             </a:r>
             <a:r>
               <a:rPr lang="en-US" dirty="0" err="1"/>
-              <a:t>XUnit</a:t>
+              <a:t>Xunit.Net</a:t>
             </a:r>
             <a:r>
               <a:rPr lang="en-US" dirty="0"/>
@@ -11477,7 +11521,7 @@
             </a:r>
             <a:r>
               <a:rPr lang="en-US" dirty="0" err="1"/>
-              <a:t>XUnit</a:t>
+              <a:t>Xunit.Net</a:t>
             </a:r>
             <a:r>
               <a:rPr lang="en-US" dirty="0"/>
@@ -11583,6 +11627,52 @@
               <a:rPr lang="en-US" dirty="0"/>
               <a:t>Unit testing with Xunit.net &amp; MOQ</a:t>
             </a:r>
+          </a:p>
+        </p:txBody>
+      </p:sp>
+      <p:sp>
+        <p:nvSpPr>
+          <p:cNvPr id="6" name="Slide Number Placeholder 5">
+            <a:extLst>
+              <a:ext uri="{FF2B5EF4-FFF2-40B4-BE49-F238E27FC236}">
+                <a16:creationId xmlns:a16="http://schemas.microsoft.com/office/drawing/2014/main" id="{FA9972AB-0932-585C-D4DB-0CCA2A2AA8C3}"/>
+              </a:ext>
+            </a:extLst>
+          </p:cNvPr>
+          <p:cNvSpPr>
+            <a:spLocks noGrp="1"/>
+          </p:cNvSpPr>
+          <p:nvPr>
+            <p:ph type="sldNum" sz="quarter" idx="12"/>
+          </p:nvPr>
+        </p:nvSpPr>
+        <p:spPr>
+          <a:xfrm>
+            <a:off x="8610600" y="6356350"/>
+            <a:ext cx="2743200" cy="365125"/>
+          </a:xfrm>
+        </p:spPr>
+        <p:txBody>
+          <a:bodyPr anchor="ctr">
+            <a:normAutofit/>
+          </a:bodyPr>
+          <a:lstStyle/>
+          <a:p>
+            <a:pPr>
+              <a:spcAft>
+                <a:spcPts val="600"/>
+              </a:spcAft>
+            </a:pPr>
+            <a:fld id="{A49DFD55-3C28-40EF-9E31-A92D2E4017FF}" type="slidenum">
+              <a:rPr lang="en-US" smtClean="0"/>
+              <a:pPr>
+                <a:spcAft>
+                  <a:spcPts val="600"/>
+                </a:spcAft>
+              </a:pPr>
+              <a:t>2</a:t>
+            </a:fld>
+            <a:endParaRPr lang="en-US" dirty="0"/>
           </a:p>
         </p:txBody>
       </p:sp>
@@ -11816,10 +11906,10 @@
       </p:sp>
       <p:sp>
         <p:nvSpPr>
-          <p:cNvPr id="6" name="Slide Number Placeholder 5">
-            <a:extLst>
-              <a:ext uri="{FF2B5EF4-FFF2-40B4-BE49-F238E27FC236}">
-                <a16:creationId xmlns:a16="http://schemas.microsoft.com/office/drawing/2014/main" id="{D1688CDC-691F-6EF5-BDB4-4C4CBCC1AA43}"/>
+          <p:cNvPr id="7" name="Slide Number Placeholder 5">
+            <a:extLst>
+              <a:ext uri="{FF2B5EF4-FFF2-40B4-BE49-F238E27FC236}">
+                <a16:creationId xmlns:a16="http://schemas.microsoft.com/office/drawing/2014/main" id="{A3A2B168-3946-3B5A-18FB-4B4F5C904B2F}"/>
               </a:ext>
             </a:extLst>
           </p:cNvPr>
@@ -11830,14 +11920,30 @@
             <p:ph type="sldNum" sz="quarter" idx="12"/>
           </p:nvPr>
         </p:nvSpPr>
-        <p:spPr/>
-        <p:txBody>
-          <a:bodyPr/>
+        <p:spPr>
+          <a:xfrm>
+            <a:off x="8610600" y="6356350"/>
+            <a:ext cx="2743200" cy="365125"/>
+          </a:xfrm>
+        </p:spPr>
+        <p:txBody>
+          <a:bodyPr anchor="ctr">
+            <a:normAutofit/>
+          </a:bodyPr>
           <a:lstStyle/>
           <a:p>
+            <a:pPr>
+              <a:spcAft>
+                <a:spcPts val="600"/>
+              </a:spcAft>
+            </a:pPr>
             <a:fld id="{A49DFD55-3C28-40EF-9E31-A92D2E4017FF}" type="slidenum">
               <a:rPr lang="en-US" smtClean="0"/>
-              <a:pPr/>
+              <a:pPr>
+                <a:spcAft>
+                  <a:spcPts val="600"/>
+                </a:spcAft>
+              </a:pPr>
               <a:t>3</a:t>
             </a:fld>
             <a:endParaRPr lang="en-US" dirty="0"/>
@@ -11938,7 +12044,9 @@
           </a:xfrm>
         </p:spPr>
         <p:txBody>
-          <a:bodyPr/>
+          <a:bodyPr>
+            <a:normAutofit/>
+          </a:bodyPr>
           <a:lstStyle/>
           <a:p>
             <a:pPr marL="285750" indent="-285750">
@@ -11978,12 +12086,8 @@
               <a:buChar char="•"/>
             </a:pPr>
             <a:r>
-              <a:rPr lang="en-US" dirty="0" err="1"/>
-              <a:t>xUnit</a:t>
-            </a:r>
-            <a:r>
-              <a:rPr lang="en-US" dirty="0"/>
-              <a:t> is designed to be extensible, flexible, and easy to use.</a:t>
+              <a:rPr lang="en-US" dirty="0"/>
+              <a:t>Designed to be extensible, flexible, and easy to use.</a:t>
             </a:r>
           </a:p>
           <a:p>
@@ -11993,7 +12097,7 @@
             </a:pPr>
             <a:r>
               <a:rPr lang="en-US" dirty="0"/>
-              <a:t>It provides a rich set of features, including test fixtures, test runners, and assertions.</a:t>
+              <a:t>Can be customized to meet the needs of specific projects.</a:t>
             </a:r>
           </a:p>
           <a:p>
@@ -12003,7 +12107,7 @@
             </a:pPr>
             <a:r>
               <a:rPr lang="en-US" dirty="0"/>
-              <a:t>It can be customized to meet the needs of specific projects.</a:t>
+              <a:t>Provides a rich set of features which include test fixtures, test runners, and assertions.</a:t>
             </a:r>
           </a:p>
           <a:p>
@@ -12013,7 +12117,7 @@
             </a:pPr>
             <a:r>
               <a:rPr lang="en-US" dirty="0"/>
-              <a:t>It’s designed to be easy to use and learn, with a simple and intuitive API.</a:t>
+              <a:t>Designed to be easy to use and learn, with a simple and intuitive API.</a:t>
             </a:r>
           </a:p>
         </p:txBody>
@@ -12135,7 +12239,7 @@
               </a:pPr>
               <a:t>4</a:t>
             </a:fld>
-            <a:endParaRPr lang="en-US"/>
+            <a:endParaRPr lang="en-US" dirty="0"/>
           </a:p>
         </p:txBody>
       </p:sp>
@@ -12595,15 +12699,11 @@
             </a:r>
             <a:r>
               <a:rPr lang="en-US" dirty="0" err="1"/>
-              <a:t>Jetbrain</a:t>
-            </a:r>
-            <a:r>
-              <a:rPr lang="en-US"/>
-              <a:t> Rider</a:t>
-            </a:r>
-            <a:r>
-              <a:rPr lang="en-US" dirty="0"/>
-              <a:t>)</a:t>
+              <a:t>Jetbrains</a:t>
+            </a:r>
+            <a:r>
+              <a:rPr lang="en-US" dirty="0"/>
+              <a:t> Rider)</a:t>
             </a:r>
           </a:p>
           <a:p>
@@ -12807,8 +12907,12 @@
               <a:buChar char="•"/>
             </a:pPr>
             <a:r>
-              <a:rPr lang="en-US" dirty="0"/>
-              <a:t>MOQ is a .NET mocking framework that aids in unit testing by creating mock objects.</a:t>
+              <a:rPr lang="en-US" dirty="0" err="1"/>
+              <a:t>Moq</a:t>
+            </a:r>
+            <a:r>
+              <a:rPr lang="en-US" dirty="0"/>
+              <a:t> is a .NET mocking framework that aids in unit testing by creating mock objects.</a:t>
             </a:r>
           </a:p>
           <a:p>
@@ -14298,22 +14402,12 @@
 </file>
 
 <file path=customXml/item1.xml><?xml version="1.0" encoding="utf-8"?>
-<p:properties xmlns:p="http://schemas.microsoft.com/office/2006/metadata/properties" xmlns:xsi="http://www.w3.org/2001/XMLSchema-instance" xmlns:pc="http://schemas.microsoft.com/office/infopath/2007/PartnerControls">
-  <documentManagement>
-    <_ip_UnifiedCompliancePolicyUIAction xmlns="http://schemas.microsoft.com/sharepoint/v3" xsi:nil="true"/>
-    <Image xmlns="71af3243-3dd4-4a8d-8c0d-dd76da1f02a5">
-      <Url xsi:nil="true"/>
-      <Description xsi:nil="true"/>
-    </Image>
-    <Status xmlns="71af3243-3dd4-4a8d-8c0d-dd76da1f02a5">Not started</Status>
-    <_ip_UnifiedCompliancePolicyProperties xmlns="http://schemas.microsoft.com/sharepoint/v3" xsi:nil="true"/>
-    <ImageTagsTaxHTField xmlns="71af3243-3dd4-4a8d-8c0d-dd76da1f02a5">
-      <Terms xmlns="http://schemas.microsoft.com/office/infopath/2007/PartnerControls"/>
-    </ImageTagsTaxHTField>
-    <TaxCatchAll xmlns="230e9df3-be65-4c73-a93b-d1236ebd677e"/>
-    <MediaServiceKeyPoints xmlns="71af3243-3dd4-4a8d-8c0d-dd76da1f02a5" xsi:nil="true"/>
-  </documentManagement>
-</p:properties>
+<?mso-contentType ?>
+<FormTemplates xmlns="http://schemas.microsoft.com/sharepoint/v3/contenttype/forms">
+  <Display>DocumentLibraryForm</Display>
+  <Edit>DocumentLibraryForm</Edit>
+  <New>DocumentLibraryForm</New>
+</FormTemplates>
 </file>
 
 <file path=customXml/item2.xml><?xml version="1.0" encoding="utf-8"?>
@@ -14593,22 +14687,28 @@
 </file>
 
 <file path=customXml/item3.xml><?xml version="1.0" encoding="utf-8"?>
-<?mso-contentType ?>
-<FormTemplates xmlns="http://schemas.microsoft.com/sharepoint/v3/contenttype/forms">
-  <Display>DocumentLibraryForm</Display>
-  <Edit>DocumentLibraryForm</Edit>
-  <New>DocumentLibraryForm</New>
-</FormTemplates>
+<p:properties xmlns:p="http://schemas.microsoft.com/office/2006/metadata/properties" xmlns:xsi="http://www.w3.org/2001/XMLSchema-instance" xmlns:pc="http://schemas.microsoft.com/office/infopath/2007/PartnerControls">
+  <documentManagement>
+    <_ip_UnifiedCompliancePolicyUIAction xmlns="http://schemas.microsoft.com/sharepoint/v3" xsi:nil="true"/>
+    <Image xmlns="71af3243-3dd4-4a8d-8c0d-dd76da1f02a5">
+      <Url xsi:nil="true"/>
+      <Description xsi:nil="true"/>
+    </Image>
+    <Status xmlns="71af3243-3dd4-4a8d-8c0d-dd76da1f02a5">Not started</Status>
+    <_ip_UnifiedCompliancePolicyProperties xmlns="http://schemas.microsoft.com/sharepoint/v3" xsi:nil="true"/>
+    <ImageTagsTaxHTField xmlns="71af3243-3dd4-4a8d-8c0d-dd76da1f02a5">
+      <Terms xmlns="http://schemas.microsoft.com/office/infopath/2007/PartnerControls"/>
+    </ImageTagsTaxHTField>
+    <TaxCatchAll xmlns="230e9df3-be65-4c73-a93b-d1236ebd677e"/>
+    <MediaServiceKeyPoints xmlns="71af3243-3dd4-4a8d-8c0d-dd76da1f02a5" xsi:nil="true"/>
+  </documentManagement>
+</p:properties>
 </file>
 
 <file path=customXml/itemProps1.xml><?xml version="1.0" encoding="utf-8"?>
-<ds:datastoreItem xmlns:ds="http://schemas.openxmlformats.org/officeDocument/2006/customXml" ds:itemID="{29C43685-694E-4579-B109-3C418D49DA65}">
+<ds:datastoreItem xmlns:ds="http://schemas.openxmlformats.org/officeDocument/2006/customXml" ds:itemID="{0FD6FE22-81A0-4500-AFD0-342D21BB9A2C}">
   <ds:schemaRefs>
-    <ds:schemaRef ds:uri="http://schemas.microsoft.com/office/2006/metadata/properties"/>
-    <ds:schemaRef ds:uri="http://schemas.microsoft.com/office/infopath/2007/PartnerControls"/>
-    <ds:schemaRef ds:uri="http://schemas.microsoft.com/sharepoint/v3"/>
-    <ds:schemaRef ds:uri="71af3243-3dd4-4a8d-8c0d-dd76da1f02a5"/>
-    <ds:schemaRef ds:uri="230e9df3-be65-4c73-a93b-d1236ebd677e"/>
+    <ds:schemaRef ds:uri="http://schemas.microsoft.com/sharepoint/v3/contenttype/forms"/>
   </ds:schemaRefs>
 </ds:datastoreItem>
 </file>
@@ -14635,9 +14735,13 @@
 </file>
 
 <file path=customXml/itemProps3.xml><?xml version="1.0" encoding="utf-8"?>
-<ds:datastoreItem xmlns:ds="http://schemas.openxmlformats.org/officeDocument/2006/customXml" ds:itemID="{0FD6FE22-81A0-4500-AFD0-342D21BB9A2C}">
+<ds:datastoreItem xmlns:ds="http://schemas.openxmlformats.org/officeDocument/2006/customXml" ds:itemID="{29C43685-694E-4579-B109-3C418D49DA65}">
   <ds:schemaRefs>
-    <ds:schemaRef ds:uri="http://schemas.microsoft.com/sharepoint/v3/contenttype/forms"/>
+    <ds:schemaRef ds:uri="http://schemas.microsoft.com/office/2006/metadata/properties"/>
+    <ds:schemaRef ds:uri="http://schemas.microsoft.com/office/infopath/2007/PartnerControls"/>
+    <ds:schemaRef ds:uri="http://schemas.microsoft.com/sharepoint/v3"/>
+    <ds:schemaRef ds:uri="71af3243-3dd4-4a8d-8c0d-dd76da1f02a5"/>
+    <ds:schemaRef ds:uri="230e9df3-be65-4c73-a93b-d1236ebd677e"/>
   </ds:schemaRefs>
 </ds:datastoreItem>
 </file>

</xml_diff>